<commit_message>
Remove modeling project from solution Update references to support OData 4
</commit_message>
<xml_diff>
--- a/WebAPI and Data.pptx
+++ b/WebAPI and Data.pptx
@@ -5,24 +5,26 @@
     <p:sldMasterId id="2147483660" r:id="rId1"/>
   </p:sldMasterIdLst>
   <p:notesMasterIdLst>
-    <p:notesMasterId r:id="rId17"/>
+    <p:notesMasterId r:id="rId19"/>
   </p:notesMasterIdLst>
   <p:sldIdLst>
     <p:sldId id="268" r:id="rId2"/>
-    <p:sldId id="258" r:id="rId3"/>
-    <p:sldId id="265" r:id="rId4"/>
-    <p:sldId id="263" r:id="rId5"/>
-    <p:sldId id="269" r:id="rId6"/>
-    <p:sldId id="274" r:id="rId7"/>
-    <p:sldId id="260" r:id="rId8"/>
-    <p:sldId id="264" r:id="rId9"/>
-    <p:sldId id="270" r:id="rId10"/>
-    <p:sldId id="275" r:id="rId11"/>
-    <p:sldId id="257" r:id="rId12"/>
-    <p:sldId id="267" r:id="rId13"/>
-    <p:sldId id="262" r:id="rId14"/>
-    <p:sldId id="271" r:id="rId15"/>
-    <p:sldId id="273" r:id="rId16"/>
+    <p:sldId id="276" r:id="rId3"/>
+    <p:sldId id="258" r:id="rId4"/>
+    <p:sldId id="265" r:id="rId5"/>
+    <p:sldId id="263" r:id="rId6"/>
+    <p:sldId id="269" r:id="rId7"/>
+    <p:sldId id="274" r:id="rId8"/>
+    <p:sldId id="260" r:id="rId9"/>
+    <p:sldId id="264" r:id="rId10"/>
+    <p:sldId id="270" r:id="rId11"/>
+    <p:sldId id="275" r:id="rId12"/>
+    <p:sldId id="257" r:id="rId13"/>
+    <p:sldId id="267" r:id="rId14"/>
+    <p:sldId id="262" r:id="rId15"/>
+    <p:sldId id="271" r:id="rId16"/>
+    <p:sldId id="277" r:id="rId17"/>
+    <p:sldId id="273" r:id="rId18"/>
   </p:sldIdLst>
   <p:sldSz cx="12192000" cy="6858000"/>
   <p:notesSz cx="6858000" cy="9144000"/>
@@ -211,7 +213,7 @@
           <a:p>
             <a:fld id="{63A03CD6-E2F3-49A7-8B93-24FC08A1DC96}" type="datetimeFigureOut">
               <a:rPr lang="en-US" smtClean="0"/>
-              <a:t>9/9/2014</a:t>
+              <a:t>6/26/2015</a:t>
             </a:fld>
             <a:endParaRPr lang="en-US"/>
           </a:p>
@@ -1308,7 +1310,7 @@
           <a:p>
             <a:fld id="{0212BA2B-C688-4DBA-9DA4-68E8380D5874}" type="slidenum">
               <a:rPr lang="en-US" smtClean="0"/>
-              <a:t>3</a:t>
+              <a:t>4</a:t>
             </a:fld>
             <a:endParaRPr lang="en-US"/>
           </a:p>
@@ -1392,7 +1394,7 @@
           <a:p>
             <a:fld id="{0212BA2B-C688-4DBA-9DA4-68E8380D5874}" type="slidenum">
               <a:rPr lang="en-US" smtClean="0"/>
-              <a:t>5</a:t>
+              <a:t>6</a:t>
             </a:fld>
             <a:endParaRPr lang="en-US"/>
           </a:p>
@@ -1500,7 +1502,7 @@
           <a:p>
             <a:fld id="{0212BA2B-C688-4DBA-9DA4-68E8380D5874}" type="slidenum">
               <a:rPr lang="en-US" smtClean="0"/>
-              <a:t>8</a:t>
+              <a:t>9</a:t>
             </a:fld>
             <a:endParaRPr lang="en-US"/>
           </a:p>
@@ -1584,7 +1586,7 @@
           <a:p>
             <a:fld id="{0212BA2B-C688-4DBA-9DA4-68E8380D5874}" type="slidenum">
               <a:rPr lang="en-US" smtClean="0"/>
-              <a:t>10</a:t>
+              <a:t>11</a:t>
             </a:fld>
             <a:endParaRPr lang="en-US"/>
           </a:p>
@@ -1668,7 +1670,7 @@
           <a:p>
             <a:fld id="{0212BA2B-C688-4DBA-9DA4-68E8380D5874}" type="slidenum">
               <a:rPr lang="en-US" smtClean="0"/>
-              <a:t>15</a:t>
+              <a:t>17</a:t>
             </a:fld>
             <a:endParaRPr lang="en-US"/>
           </a:p>
@@ -2189,7 +2191,7 @@
           <a:p>
             <a:fld id="{CB293217-2C1A-4AAE-948E-700BCDD5810A}" type="datetimeFigureOut">
               <a:rPr lang="en-US" smtClean="0"/>
-              <a:t>9/9/2014</a:t>
+              <a:t>6/26/2015</a:t>
             </a:fld>
             <a:endParaRPr lang="en-US"/>
           </a:p>
@@ -2485,7 +2487,7 @@
           <a:p>
             <a:fld id="{CB293217-2C1A-4AAE-948E-700BCDD5810A}" type="datetimeFigureOut">
               <a:rPr lang="en-US" smtClean="0"/>
-              <a:t>9/9/2014</a:t>
+              <a:t>6/26/2015</a:t>
             </a:fld>
             <a:endParaRPr lang="en-US"/>
           </a:p>
@@ -2733,7 +2735,7 @@
           <a:p>
             <a:fld id="{CB293217-2C1A-4AAE-948E-700BCDD5810A}" type="datetimeFigureOut">
               <a:rPr lang="en-US" smtClean="0"/>
-              <a:t>9/9/2014</a:t>
+              <a:t>6/26/2015</a:t>
             </a:fld>
             <a:endParaRPr lang="en-US"/>
           </a:p>
@@ -3273,7 +3275,7 @@
           <a:p>
             <a:fld id="{CB293217-2C1A-4AAE-948E-700BCDD5810A}" type="datetimeFigureOut">
               <a:rPr lang="en-US" smtClean="0"/>
-              <a:t>9/9/2014</a:t>
+              <a:t>6/26/2015</a:t>
             </a:fld>
             <a:endParaRPr lang="en-US"/>
           </a:p>
@@ -3521,7 +3523,7 @@
           <a:p>
             <a:fld id="{CB293217-2C1A-4AAE-948E-700BCDD5810A}" type="datetimeFigureOut">
               <a:rPr lang="en-US" smtClean="0"/>
-              <a:t>9/9/2014</a:t>
+              <a:t>6/26/2015</a:t>
             </a:fld>
             <a:endParaRPr lang="en-US"/>
           </a:p>
@@ -4053,7 +4055,7 @@
           <a:p>
             <a:fld id="{CB293217-2C1A-4AAE-948E-700BCDD5810A}" type="datetimeFigureOut">
               <a:rPr lang="en-US" smtClean="0"/>
-              <a:t>9/9/2014</a:t>
+              <a:t>6/26/2015</a:t>
             </a:fld>
             <a:endParaRPr lang="en-US"/>
           </a:p>
@@ -4350,7 +4352,7 @@
           <a:p>
             <a:fld id="{CB293217-2C1A-4AAE-948E-700BCDD5810A}" type="datetimeFigureOut">
               <a:rPr lang="en-US" smtClean="0"/>
-              <a:t>9/9/2014</a:t>
+              <a:t>6/26/2015</a:t>
             </a:fld>
             <a:endParaRPr lang="en-US"/>
           </a:p>
@@ -4524,7 +4526,7 @@
           <a:p>
             <a:fld id="{CB293217-2C1A-4AAE-948E-700BCDD5810A}" type="datetimeFigureOut">
               <a:rPr lang="en-US" smtClean="0"/>
-              <a:t>9/9/2014</a:t>
+              <a:t>6/26/2015</a:t>
             </a:fld>
             <a:endParaRPr lang="en-US"/>
           </a:p>
@@ -4704,7 +4706,7 @@
           <a:p>
             <a:fld id="{CB293217-2C1A-4AAE-948E-700BCDD5810A}" type="datetimeFigureOut">
               <a:rPr lang="en-US" smtClean="0"/>
-              <a:t>9/9/2014</a:t>
+              <a:t>6/26/2015</a:t>
             </a:fld>
             <a:endParaRPr lang="en-US"/>
           </a:p>
@@ -4874,7 +4876,7 @@
           <a:p>
             <a:fld id="{CB293217-2C1A-4AAE-948E-700BCDD5810A}" type="datetimeFigureOut">
               <a:rPr lang="en-US" smtClean="0"/>
-              <a:t>9/9/2014</a:t>
+              <a:t>6/26/2015</a:t>
             </a:fld>
             <a:endParaRPr lang="en-US"/>
           </a:p>
@@ -5125,7 +5127,7 @@
           <a:p>
             <a:fld id="{CB293217-2C1A-4AAE-948E-700BCDD5810A}" type="datetimeFigureOut">
               <a:rPr lang="en-US" smtClean="0"/>
-              <a:t>9/9/2014</a:t>
+              <a:t>6/26/2015</a:t>
             </a:fld>
             <a:endParaRPr lang="en-US"/>
           </a:p>
@@ -5422,7 +5424,7 @@
           <a:p>
             <a:fld id="{CB293217-2C1A-4AAE-948E-700BCDD5810A}" type="datetimeFigureOut">
               <a:rPr lang="en-US" smtClean="0"/>
-              <a:t>9/9/2014</a:t>
+              <a:t>6/26/2015</a:t>
             </a:fld>
             <a:endParaRPr lang="en-US"/>
           </a:p>
@@ -5864,7 +5866,7 @@
           <a:p>
             <a:fld id="{CB293217-2C1A-4AAE-948E-700BCDD5810A}" type="datetimeFigureOut">
               <a:rPr lang="en-US" smtClean="0"/>
-              <a:t>9/9/2014</a:t>
+              <a:t>6/26/2015</a:t>
             </a:fld>
             <a:endParaRPr lang="en-US"/>
           </a:p>
@@ -5982,7 +5984,7 @@
           <a:p>
             <a:fld id="{CB293217-2C1A-4AAE-948E-700BCDD5810A}" type="datetimeFigureOut">
               <a:rPr lang="en-US" smtClean="0"/>
-              <a:t>9/9/2014</a:t>
+              <a:t>6/26/2015</a:t>
             </a:fld>
             <a:endParaRPr lang="en-US"/>
           </a:p>
@@ -6077,7 +6079,7 @@
           <a:p>
             <a:fld id="{CB293217-2C1A-4AAE-948E-700BCDD5810A}" type="datetimeFigureOut">
               <a:rPr lang="en-US" smtClean="0"/>
-              <a:t>9/9/2014</a:t>
+              <a:t>6/26/2015</a:t>
             </a:fld>
             <a:endParaRPr lang="en-US"/>
           </a:p>
@@ -6360,7 +6362,7 @@
           <a:p>
             <a:fld id="{CB293217-2C1A-4AAE-948E-700BCDD5810A}" type="datetimeFigureOut">
               <a:rPr lang="en-US" smtClean="0"/>
-              <a:t>9/9/2014</a:t>
+              <a:t>6/26/2015</a:t>
             </a:fld>
             <a:endParaRPr lang="en-US"/>
           </a:p>
@@ -6651,7 +6653,7 @@
           <a:p>
             <a:fld id="{CB293217-2C1A-4AAE-948E-700BCDD5810A}" type="datetimeFigureOut">
               <a:rPr lang="en-US" smtClean="0"/>
-              <a:t>9/9/2014</a:t>
+              <a:t>6/26/2015</a:t>
             </a:fld>
             <a:endParaRPr lang="en-US"/>
           </a:p>
@@ -7181,7 +7183,7 @@
           <a:p>
             <a:fld id="{CB293217-2C1A-4AAE-948E-700BCDD5810A}" type="datetimeFigureOut">
               <a:rPr lang="en-US" smtClean="0"/>
-              <a:t>9/9/2014</a:t>
+              <a:t>6/26/2015</a:t>
             </a:fld>
             <a:endParaRPr lang="en-US"/>
           </a:p>
@@ -7987,6 +7989,195 @@
           <a:bodyPr/>
           <a:lstStyle/>
           <a:p>
+            <a:r>
+              <a:rPr lang="en-US" dirty="0" smtClean="0"/>
+              <a:t>$filter</a:t>
+            </a:r>
+            <a:endParaRPr lang="en-US" dirty="0"/>
+          </a:p>
+        </p:txBody>
+      </p:sp>
+      <p:sp>
+        <p:nvSpPr>
+          <p:cNvPr id="3" name="Content Placeholder 2"/>
+          <p:cNvSpPr>
+            <a:spLocks noGrp="1"/>
+          </p:cNvSpPr>
+          <p:nvPr>
+            <p:ph sz="half" idx="1"/>
+          </p:nvPr>
+        </p:nvSpPr>
+        <p:spPr/>
+        <p:txBody>
+          <a:bodyPr>
+            <a:noAutofit/>
+          </a:bodyPr>
+          <a:lstStyle/>
+          <a:p>
+            <a:r>
+              <a:rPr lang="en-US" sz="2800" dirty="0" err="1" smtClean="0"/>
+              <a:t>eq</a:t>
+            </a:r>
+            <a:r>
+              <a:rPr lang="en-US" sz="2800" dirty="0" smtClean="0"/>
+              <a:t> – Equals</a:t>
+            </a:r>
+          </a:p>
+          <a:p>
+            <a:r>
+              <a:rPr lang="en-US" sz="2800" dirty="0" smtClean="0"/>
+              <a:t>ne  - Not Equals</a:t>
+            </a:r>
+          </a:p>
+          <a:p>
+            <a:r>
+              <a:rPr lang="en-US" sz="2800" dirty="0" err="1" smtClean="0"/>
+              <a:t>gt</a:t>
+            </a:r>
+            <a:r>
+              <a:rPr lang="en-US" sz="2800" dirty="0" smtClean="0"/>
+              <a:t> – Greater Than</a:t>
+            </a:r>
+          </a:p>
+          <a:p>
+            <a:r>
+              <a:rPr lang="en-US" sz="2800" dirty="0" err="1" smtClean="0"/>
+              <a:t>ge</a:t>
+            </a:r>
+            <a:r>
+              <a:rPr lang="en-US" sz="2800" dirty="0" smtClean="0"/>
+              <a:t> – Greater Than or Equal</a:t>
+            </a:r>
+          </a:p>
+          <a:p>
+            <a:r>
+              <a:rPr lang="en-US" sz="2800" dirty="0" err="1" smtClean="0"/>
+              <a:t>lt</a:t>
+            </a:r>
+            <a:r>
+              <a:rPr lang="en-US" sz="2800" dirty="0" smtClean="0"/>
+              <a:t> – Less Than</a:t>
+            </a:r>
+          </a:p>
+          <a:p>
+            <a:r>
+              <a:rPr lang="en-US" sz="2800" dirty="0" smtClean="0"/>
+              <a:t>le – Less than or Equal</a:t>
+            </a:r>
+            <a:endParaRPr lang="en-US" sz="2800" dirty="0"/>
+          </a:p>
+        </p:txBody>
+      </p:sp>
+      <p:sp>
+        <p:nvSpPr>
+          <p:cNvPr id="5" name="Content Placeholder 4"/>
+          <p:cNvSpPr>
+            <a:spLocks noGrp="1"/>
+          </p:cNvSpPr>
+          <p:nvPr>
+            <p:ph sz="half" idx="2"/>
+          </p:nvPr>
+        </p:nvSpPr>
+        <p:spPr/>
+        <p:txBody>
+          <a:bodyPr>
+            <a:noAutofit/>
+          </a:bodyPr>
+          <a:lstStyle/>
+          <a:p>
+            <a:r>
+              <a:rPr lang="en-US" sz="2800" dirty="0" err="1" smtClean="0"/>
+              <a:t>Endswith</a:t>
+            </a:r>
+            <a:endParaRPr lang="en-US" sz="2800" dirty="0"/>
+          </a:p>
+          <a:p>
+            <a:r>
+              <a:rPr lang="en-US" sz="2800" dirty="0" err="1" smtClean="0"/>
+              <a:t>Startswith</a:t>
+            </a:r>
+            <a:endParaRPr lang="en-US" sz="2800" dirty="0" smtClean="0"/>
+          </a:p>
+          <a:p>
+            <a:r>
+              <a:rPr lang="en-US" sz="2800" dirty="0" smtClean="0"/>
+              <a:t>Length</a:t>
+            </a:r>
+          </a:p>
+          <a:p>
+            <a:r>
+              <a:rPr lang="en-US" sz="2800" dirty="0" smtClean="0"/>
+              <a:t>substring</a:t>
+            </a:r>
+          </a:p>
+          <a:p>
+            <a:r>
+              <a:rPr lang="en-US" sz="2800" dirty="0" smtClean="0"/>
+              <a:t>contains</a:t>
+            </a:r>
+            <a:endParaRPr lang="en-US" sz="2800" dirty="0" smtClean="0"/>
+          </a:p>
+          <a:p>
+            <a:r>
+              <a:rPr lang="en-US" sz="2800" dirty="0" smtClean="0"/>
+              <a:t>And others</a:t>
+            </a:r>
+            <a:endParaRPr lang="en-US" sz="2800" dirty="0"/>
+          </a:p>
+        </p:txBody>
+      </p:sp>
+    </p:spTree>
+    <p:extLst>
+      <p:ext uri="{BB962C8B-B14F-4D97-AF65-F5344CB8AC3E}">
+        <p14:creationId xmlns:p14="http://schemas.microsoft.com/office/powerpoint/2010/main" val="2338928395"/>
+      </p:ext>
+    </p:extLst>
+  </p:cSld>
+  <p:clrMapOvr>
+    <a:masterClrMapping/>
+  </p:clrMapOvr>
+  <p:timing>
+    <p:tnLst>
+      <p:par>
+        <p:cTn id="1" dur="indefinite" restart="never" nodeType="tmRoot"/>
+      </p:par>
+    </p:tnLst>
+  </p:timing>
+</p:sld>
+</file>
+
+<file path=ppt/slides/slide11.xml><?xml version="1.0" encoding="utf-8"?>
+<p:sld xmlns:a="http://schemas.openxmlformats.org/drawingml/2006/main" xmlns:r="http://schemas.openxmlformats.org/officeDocument/2006/relationships" xmlns:p="http://schemas.openxmlformats.org/presentationml/2006/main">
+  <p:cSld>
+    <p:spTree>
+      <p:nvGrpSpPr>
+        <p:cNvPr id="1" name=""/>
+        <p:cNvGrpSpPr/>
+        <p:nvPr/>
+      </p:nvGrpSpPr>
+      <p:grpSpPr>
+        <a:xfrm>
+          <a:off x="0" y="0"/>
+          <a:ext cx="0" cy="0"/>
+          <a:chOff x="0" y="0"/>
+          <a:chExt cx="0" cy="0"/>
+        </a:xfrm>
+      </p:grpSpPr>
+      <p:sp>
+        <p:nvSpPr>
+          <p:cNvPr id="2" name="Title 1"/>
+          <p:cNvSpPr>
+            <a:spLocks noGrp="1"/>
+          </p:cNvSpPr>
+          <p:nvPr>
+            <p:ph type="title"/>
+          </p:nvPr>
+        </p:nvSpPr>
+        <p:spPr/>
+        <p:txBody>
+          <a:bodyPr/>
+          <a:lstStyle/>
+          <a:p>
             <a:endParaRPr lang="en-US"/>
           </a:p>
         </p:txBody>
@@ -8040,7 +8231,7 @@
 </p:sld>
 </file>
 
-<file path=ppt/slides/slide11.xml><?xml version="1.0" encoding="utf-8"?>
+<file path=ppt/slides/slide12.xml><?xml version="1.0" encoding="utf-8"?>
 <p:sld xmlns:a="http://schemas.openxmlformats.org/drawingml/2006/main" xmlns:r="http://schemas.openxmlformats.org/officeDocument/2006/relationships" xmlns:p="http://schemas.openxmlformats.org/presentationml/2006/main">
   <p:cSld>
     <p:spTree>
@@ -8129,7 +8320,7 @@
 </p:sld>
 </file>
 
-<file path=ppt/slides/slide12.xml><?xml version="1.0" encoding="utf-8"?>
+<file path=ppt/slides/slide13.xml><?xml version="1.0" encoding="utf-8"?>
 <p:sld xmlns:a="http://schemas.openxmlformats.org/drawingml/2006/main" xmlns:r="http://schemas.openxmlformats.org/officeDocument/2006/relationships" xmlns:p="http://schemas.openxmlformats.org/presentationml/2006/main">
   <p:cSld>
     <p:spTree>
@@ -8222,7 +8413,7 @@
 </p:sld>
 </file>
 
-<file path=ppt/slides/slide13.xml><?xml version="1.0" encoding="utf-8"?>
+<file path=ppt/slides/slide14.xml><?xml version="1.0" encoding="utf-8"?>
 <p:sld xmlns:a="http://schemas.openxmlformats.org/drawingml/2006/main" xmlns:r="http://schemas.openxmlformats.org/officeDocument/2006/relationships" xmlns:p="http://schemas.openxmlformats.org/presentationml/2006/main">
   <p:cSld>
     <p:spTree>
@@ -8339,7 +8530,7 @@
 </p:sld>
 </file>
 
-<file path=ppt/slides/slide14.xml><?xml version="1.0" encoding="utf-8"?>
+<file path=ppt/slides/slide15.xml><?xml version="1.0" encoding="utf-8"?>
 <p:sld xmlns:a="http://schemas.openxmlformats.org/drawingml/2006/main" xmlns:r="http://schemas.openxmlformats.org/officeDocument/2006/relationships" xmlns:p="http://schemas.openxmlformats.org/presentationml/2006/main" show="0">
   <p:cSld>
     <p:spTree>
@@ -8426,7 +8617,86 @@
 </p:sld>
 </file>
 
-<file path=ppt/slides/slide15.xml><?xml version="1.0" encoding="utf-8"?>
+<file path=ppt/slides/slide16.xml><?xml version="1.0" encoding="utf-8"?>
+<p:sld xmlns:a="http://schemas.openxmlformats.org/drawingml/2006/main" xmlns:r="http://schemas.openxmlformats.org/officeDocument/2006/relationships" xmlns:p="http://schemas.openxmlformats.org/presentationml/2006/main">
+  <p:cSld>
+    <p:spTree>
+      <p:nvGrpSpPr>
+        <p:cNvPr id="1" name=""/>
+        <p:cNvGrpSpPr/>
+        <p:nvPr/>
+      </p:nvGrpSpPr>
+      <p:grpSpPr>
+        <a:xfrm>
+          <a:off x="0" y="0"/>
+          <a:ext cx="0" cy="0"/>
+          <a:chOff x="0" y="0"/>
+          <a:chExt cx="0" cy="0"/>
+        </a:xfrm>
+      </p:grpSpPr>
+      <p:sp>
+        <p:nvSpPr>
+          <p:cNvPr id="2" name="Title 1"/>
+          <p:cNvSpPr>
+            <a:spLocks noGrp="1"/>
+          </p:cNvSpPr>
+          <p:nvPr>
+            <p:ph type="title"/>
+          </p:nvPr>
+        </p:nvSpPr>
+        <p:spPr/>
+        <p:txBody>
+          <a:bodyPr/>
+          <a:lstStyle/>
+          <a:p>
+            <a:r>
+              <a:rPr lang="en-US" dirty="0" smtClean="0"/>
+              <a:t>Remember your surveys</a:t>
+            </a:r>
+            <a:endParaRPr lang="en-US" dirty="0"/>
+          </a:p>
+        </p:txBody>
+      </p:sp>
+      <p:sp>
+        <p:nvSpPr>
+          <p:cNvPr id="4" name="Text Placeholder 3"/>
+          <p:cNvSpPr>
+            <a:spLocks noGrp="1"/>
+          </p:cNvSpPr>
+          <p:nvPr>
+            <p:ph type="body" idx="1"/>
+          </p:nvPr>
+        </p:nvSpPr>
+        <p:spPr/>
+        <p:txBody>
+          <a:bodyPr/>
+          <a:lstStyle/>
+          <a:p>
+            <a:endParaRPr lang="en-US"/>
+          </a:p>
+        </p:txBody>
+      </p:sp>
+    </p:spTree>
+    <p:extLst>
+      <p:ext uri="{BB962C8B-B14F-4D97-AF65-F5344CB8AC3E}">
+        <p14:creationId xmlns:p14="http://schemas.microsoft.com/office/powerpoint/2010/main" val="1768060324"/>
+      </p:ext>
+    </p:extLst>
+  </p:cSld>
+  <p:clrMapOvr>
+    <a:masterClrMapping/>
+  </p:clrMapOvr>
+  <p:timing>
+    <p:tnLst>
+      <p:par>
+        <p:cTn id="1" dur="indefinite" restart="never" nodeType="tmRoot"/>
+      </p:par>
+    </p:tnLst>
+  </p:timing>
+</p:sld>
+</file>
+
+<file path=ppt/slides/slide17.xml><?xml version="1.0" encoding="utf-8"?>
 <p:sld xmlns:a="http://schemas.openxmlformats.org/drawingml/2006/main" xmlns:r="http://schemas.openxmlformats.org/officeDocument/2006/relationships" xmlns:p="http://schemas.openxmlformats.org/presentationml/2006/main">
   <p:cSld>
     <p:spTree>
@@ -8714,6 +8984,1370 @@
           <a:chExt cx="0" cy="0"/>
         </a:xfrm>
       </p:grpSpPr>
+      <p:graphicFrame>
+        <p:nvGraphicFramePr>
+          <p:cNvPr id="5" name="Table 4"/>
+          <p:cNvGraphicFramePr>
+            <a:graphicFrameLocks noGrp="1"/>
+          </p:cNvGraphicFramePr>
+          <p:nvPr>
+            <p:extLst>
+              <p:ext uri="{D42A27DB-BD31-4B8C-83A1-F6EECF244321}">
+                <p14:modId xmlns:p14="http://schemas.microsoft.com/office/powerpoint/2010/main" val="2789500122"/>
+              </p:ext>
+            </p:extLst>
+          </p:nvPr>
+        </p:nvGraphicFramePr>
+        <p:xfrm>
+          <a:off x="2630711" y="113491"/>
+          <a:ext cx="8956888" cy="1586405"/>
+        </p:xfrm>
+        <a:graphic>
+          <a:graphicData uri="http://schemas.openxmlformats.org/drawingml/2006/table">
+            <a:tbl>
+              <a:tblPr firstRow="1" bandRow="1">
+                <a:tableStyleId>{5C22544A-7EE6-4342-B048-85BDC9FD1C3A}</a:tableStyleId>
+              </a:tblPr>
+              <a:tblGrid>
+                <a:gridCol w="8956888">
+                  <a:extLst>
+                    <a:ext uri="{9D8B030D-6E8A-4147-A177-3AD203B41FA5}">
+                      <a16:colId xmlns:a16="http://schemas.microsoft.com/office/drawing/2014/main" val="20000"/>
+                    </a:ext>
+                  </a:extLst>
+                </a:gridCol>
+              </a:tblGrid>
+              <a:tr h="1586405">
+                <a:tc>
+                  <a:txBody>
+                    <a:bodyPr/>
+                    <a:lstStyle/>
+                    <a:p>
+                      <a:pPr algn="l"/>
+                      <a:r>
+                        <a:rPr lang="en-US" sz="2400" u="sng" dirty="0" smtClean="0">
+                          <a:solidFill>
+                            <a:schemeClr val="tx1"/>
+                          </a:solidFill>
+                        </a:rPr>
+                        <a:t>Titanium</a:t>
+                      </a:r>
+                      <a:r>
+                        <a:rPr lang="en-US" sz="2400" u="sng" baseline="0" dirty="0" smtClean="0">
+                          <a:solidFill>
+                            <a:schemeClr val="tx1"/>
+                          </a:solidFill>
+                        </a:rPr>
+                        <a:t> Sponsors</a:t>
+                      </a:r>
+                      <a:endParaRPr lang="en-US" sz="2400" u="sng" dirty="0">
+                        <a:solidFill>
+                          <a:schemeClr val="tx1"/>
+                        </a:solidFill>
+                      </a:endParaRPr>
+                    </a:p>
+                  </a:txBody>
+                  <a:tcPr>
+                    <a:lnL w="12700" cap="flat" cmpd="sng" algn="ctr">
+                      <a:solidFill>
+                        <a:scrgbClr r="0" g="0" b="0"/>
+                      </a:solidFill>
+                      <a:prstDash val="solid"/>
+                      <a:round/>
+                      <a:headEnd type="none" w="med" len="med"/>
+                      <a:tailEnd type="none" w="med" len="med"/>
+                    </a:lnL>
+                    <a:lnR w="12700" cap="flat" cmpd="sng" algn="ctr">
+                      <a:solidFill>
+                        <a:scrgbClr r="0" g="0" b="0"/>
+                      </a:solidFill>
+                      <a:prstDash val="solid"/>
+                      <a:round/>
+                      <a:headEnd type="none" w="med" len="med"/>
+                      <a:tailEnd type="none" w="med" len="med"/>
+                    </a:lnR>
+                    <a:lnT w="12700" cap="flat" cmpd="sng" algn="ctr">
+                      <a:solidFill>
+                        <a:scrgbClr r="0" g="0" b="0"/>
+                      </a:solidFill>
+                      <a:prstDash val="solid"/>
+                      <a:round/>
+                      <a:headEnd type="none" w="med" len="med"/>
+                      <a:tailEnd type="none" w="med" len="med"/>
+                    </a:lnT>
+                    <a:lnB w="12700" cap="flat" cmpd="sng" algn="ctr">
+                      <a:solidFill>
+                        <a:scrgbClr r="0" g="0" b="0"/>
+                      </a:solidFill>
+                      <a:prstDash val="solid"/>
+                      <a:round/>
+                      <a:headEnd type="none" w="med" len="med"/>
+                      <a:tailEnd type="none" w="med" len="med"/>
+                    </a:lnB>
+                    <a:solidFill>
+                      <a:schemeClr val="bg1"/>
+                    </a:solidFill>
+                  </a:tcPr>
+                </a:tc>
+                <a:extLst>
+                  <a:ext uri="{0D108BD9-81ED-4DB2-BD59-A6C34878D82A}">
+                    <a16:rowId xmlns:a16="http://schemas.microsoft.com/office/drawing/2014/main" val="10000"/>
+                  </a:ext>
+                </a:extLst>
+              </a:tr>
+            </a:tbl>
+          </a:graphicData>
+        </a:graphic>
+      </p:graphicFrame>
+      <p:pic>
+        <p:nvPicPr>
+          <p:cNvPr id="6" name="Picture 5" descr="Paige Technologies.png"/>
+          <p:cNvPicPr>
+            <a:picLocks noChangeAspect="1"/>
+          </p:cNvPicPr>
+          <p:nvPr/>
+        </p:nvPicPr>
+        <p:blipFill>
+          <a:blip r:embed="rId2">
+            <a:extLst>
+              <a:ext uri="{28A0092B-C50C-407E-A947-70E740481C1C}">
+                <a14:useLocalDpi xmlns:a14="http://schemas.microsoft.com/office/drawing/2010/main" val="0"/>
+              </a:ext>
+            </a:extLst>
+          </a:blip>
+          <a:stretch>
+            <a:fillRect/>
+          </a:stretch>
+        </p:blipFill>
+        <p:spPr>
+          <a:xfrm>
+            <a:off x="9298119" y="246435"/>
+            <a:ext cx="2201968" cy="1254565"/>
+          </a:xfrm>
+          <a:prstGeom prst="rect">
+            <a:avLst/>
+          </a:prstGeom>
+        </p:spPr>
+      </p:pic>
+      <p:pic>
+        <p:nvPicPr>
+          <p:cNvPr id="7" name="Picture 6" descr="Valorem.png"/>
+          <p:cNvPicPr>
+            <a:picLocks noChangeAspect="1"/>
+          </p:cNvPicPr>
+          <p:nvPr/>
+        </p:nvPicPr>
+        <p:blipFill>
+          <a:blip r:embed="rId3">
+            <a:extLst>
+              <a:ext uri="{28A0092B-C50C-407E-A947-70E740481C1C}">
+                <a14:useLocalDpi xmlns:a14="http://schemas.microsoft.com/office/drawing/2010/main" val="0"/>
+              </a:ext>
+            </a:extLst>
+          </a:blip>
+          <a:stretch>
+            <a:fillRect/>
+          </a:stretch>
+        </p:blipFill>
+        <p:spPr>
+          <a:xfrm>
+            <a:off x="7466690" y="368827"/>
+            <a:ext cx="1881847" cy="1254565"/>
+          </a:xfrm>
+          <a:prstGeom prst="rect">
+            <a:avLst/>
+          </a:prstGeom>
+        </p:spPr>
+      </p:pic>
+      <p:graphicFrame>
+        <p:nvGraphicFramePr>
+          <p:cNvPr id="8" name="Table 7"/>
+          <p:cNvGraphicFramePr>
+            <a:graphicFrameLocks noGrp="1"/>
+          </p:cNvGraphicFramePr>
+          <p:nvPr>
+            <p:extLst>
+              <p:ext uri="{D42A27DB-BD31-4B8C-83A1-F6EECF244321}">
+                <p14:modId xmlns:p14="http://schemas.microsoft.com/office/powerpoint/2010/main" val="2615956647"/>
+              </p:ext>
+            </p:extLst>
+          </p:nvPr>
+        </p:nvGraphicFramePr>
+        <p:xfrm>
+          <a:off x="2622469" y="1914089"/>
+          <a:ext cx="8956888" cy="1448900"/>
+        </p:xfrm>
+        <a:graphic>
+          <a:graphicData uri="http://schemas.openxmlformats.org/drawingml/2006/table">
+            <a:tbl>
+              <a:tblPr firstRow="1" bandRow="1">
+                <a:tableStyleId>{5C22544A-7EE6-4342-B048-85BDC9FD1C3A}</a:tableStyleId>
+              </a:tblPr>
+              <a:tblGrid>
+                <a:gridCol w="8956888">
+                  <a:extLst>
+                    <a:ext uri="{9D8B030D-6E8A-4147-A177-3AD203B41FA5}">
+                      <a16:colId xmlns:a16="http://schemas.microsoft.com/office/drawing/2014/main" val="20000"/>
+                    </a:ext>
+                  </a:extLst>
+                </a:gridCol>
+              </a:tblGrid>
+              <a:tr h="1448900">
+                <a:tc>
+                  <a:txBody>
+                    <a:bodyPr/>
+                    <a:lstStyle/>
+                    <a:p>
+                      <a:r>
+                        <a:rPr lang="en-US" sz="2000" u="sng" dirty="0" smtClean="0">
+                          <a:solidFill>
+                            <a:schemeClr val="tx1"/>
+                          </a:solidFill>
+                        </a:rPr>
+                        <a:t>Platinum</a:t>
+                      </a:r>
+                      <a:r>
+                        <a:rPr lang="en-US" sz="2000" u="sng" baseline="0" dirty="0" smtClean="0">
+                          <a:solidFill>
+                            <a:srgbClr val="000000"/>
+                          </a:solidFill>
+                        </a:rPr>
+                        <a:t> Sponsors</a:t>
+                      </a:r>
+                      <a:endParaRPr lang="en-US" sz="2000" u="sng" dirty="0">
+                        <a:solidFill>
+                          <a:srgbClr val="000000"/>
+                        </a:solidFill>
+                      </a:endParaRPr>
+                    </a:p>
+                  </a:txBody>
+                  <a:tcPr>
+                    <a:lnL w="12700" cap="flat" cmpd="sng" algn="ctr">
+                      <a:solidFill>
+                        <a:scrgbClr r="0" g="0" b="0"/>
+                      </a:solidFill>
+                      <a:prstDash val="solid"/>
+                      <a:round/>
+                      <a:headEnd type="none" w="med" len="med"/>
+                      <a:tailEnd type="none" w="med" len="med"/>
+                    </a:lnL>
+                    <a:lnR w="12700" cap="flat" cmpd="sng" algn="ctr">
+                      <a:solidFill>
+                        <a:scrgbClr r="0" g="0" b="0"/>
+                      </a:solidFill>
+                      <a:prstDash val="solid"/>
+                      <a:round/>
+                      <a:headEnd type="none" w="med" len="med"/>
+                      <a:tailEnd type="none" w="med" len="med"/>
+                    </a:lnR>
+                    <a:lnT w="12700" cap="flat" cmpd="sng" algn="ctr">
+                      <a:solidFill>
+                        <a:scrgbClr r="0" g="0" b="0"/>
+                      </a:solidFill>
+                      <a:prstDash val="solid"/>
+                      <a:round/>
+                      <a:headEnd type="none" w="med" len="med"/>
+                      <a:tailEnd type="none" w="med" len="med"/>
+                    </a:lnT>
+                    <a:lnB w="12700" cap="flat" cmpd="sng" algn="ctr">
+                      <a:solidFill>
+                        <a:scrgbClr r="0" g="0" b="0"/>
+                      </a:solidFill>
+                      <a:prstDash val="solid"/>
+                      <a:round/>
+                      <a:headEnd type="none" w="med" len="med"/>
+                      <a:tailEnd type="none" w="med" len="med"/>
+                    </a:lnB>
+                    <a:solidFill>
+                      <a:srgbClr val="FFFFFF"/>
+                    </a:solidFill>
+                  </a:tcPr>
+                </a:tc>
+                <a:extLst>
+                  <a:ext uri="{0D108BD9-81ED-4DB2-BD59-A6C34878D82A}">
+                    <a16:rowId xmlns:a16="http://schemas.microsoft.com/office/drawing/2014/main" val="10000"/>
+                  </a:ext>
+                </a:extLst>
+              </a:tr>
+            </a:tbl>
+          </a:graphicData>
+        </a:graphic>
+      </p:graphicFrame>
+      <p:pic>
+        <p:nvPicPr>
+          <p:cNvPr id="9" name="Picture 8" descr="Adaptive Solutions Group.png"/>
+          <p:cNvPicPr>
+            <a:picLocks noChangeAspect="1"/>
+          </p:cNvPicPr>
+          <p:nvPr/>
+        </p:nvPicPr>
+        <p:blipFill>
+          <a:blip r:embed="rId4">
+            <a:extLst>
+              <a:ext uri="{28A0092B-C50C-407E-A947-70E740481C1C}">
+                <a14:useLocalDpi xmlns:a14="http://schemas.microsoft.com/office/drawing/2010/main" val="0"/>
+              </a:ext>
+            </a:extLst>
+          </a:blip>
+          <a:stretch>
+            <a:fillRect/>
+          </a:stretch>
+        </p:blipFill>
+        <p:spPr>
+          <a:xfrm>
+            <a:off x="7831341" y="2097728"/>
+            <a:ext cx="2313148" cy="454920"/>
+          </a:xfrm>
+          <a:prstGeom prst="rect">
+            <a:avLst/>
+          </a:prstGeom>
+        </p:spPr>
+      </p:pic>
+      <p:pic>
+        <p:nvPicPr>
+          <p:cNvPr id="10" name="Picture 9" descr="Epiq Systems.png"/>
+          <p:cNvPicPr>
+            <a:picLocks noChangeAspect="1"/>
+          </p:cNvPicPr>
+          <p:nvPr/>
+        </p:nvPicPr>
+        <p:blipFill>
+          <a:blip r:embed="rId5">
+            <a:extLst>
+              <a:ext uri="{28A0092B-C50C-407E-A947-70E740481C1C}">
+                <a14:useLocalDpi xmlns:a14="http://schemas.microsoft.com/office/drawing/2010/main" val="0"/>
+              </a:ext>
+            </a:extLst>
+          </a:blip>
+          <a:stretch>
+            <a:fillRect/>
+          </a:stretch>
+        </p:blipFill>
+        <p:spPr>
+          <a:xfrm>
+            <a:off x="5319548" y="429867"/>
+            <a:ext cx="2301356" cy="1012597"/>
+          </a:xfrm>
+          <a:prstGeom prst="rect">
+            <a:avLst/>
+          </a:prstGeom>
+        </p:spPr>
+      </p:pic>
+      <p:graphicFrame>
+        <p:nvGraphicFramePr>
+          <p:cNvPr id="11" name="Table 10"/>
+          <p:cNvGraphicFramePr>
+            <a:graphicFrameLocks noGrp="1"/>
+          </p:cNvGraphicFramePr>
+          <p:nvPr>
+            <p:extLst>
+              <p:ext uri="{D42A27DB-BD31-4B8C-83A1-F6EECF244321}">
+                <p14:modId xmlns:p14="http://schemas.microsoft.com/office/powerpoint/2010/main" val="3152542618"/>
+              </p:ext>
+            </p:extLst>
+          </p:nvPr>
+        </p:nvGraphicFramePr>
+        <p:xfrm>
+          <a:off x="2630711" y="3612334"/>
+          <a:ext cx="8956888" cy="3090498"/>
+        </p:xfrm>
+        <a:graphic>
+          <a:graphicData uri="http://schemas.openxmlformats.org/drawingml/2006/table">
+            <a:tbl>
+              <a:tblPr firstRow="1" bandRow="1">
+                <a:tableStyleId>{5C22544A-7EE6-4342-B048-85BDC9FD1C3A}</a:tableStyleId>
+              </a:tblPr>
+              <a:tblGrid>
+                <a:gridCol w="8956888">
+                  <a:extLst>
+                    <a:ext uri="{9D8B030D-6E8A-4147-A177-3AD203B41FA5}">
+                      <a16:colId xmlns:a16="http://schemas.microsoft.com/office/drawing/2014/main" val="20000"/>
+                    </a:ext>
+                  </a:extLst>
+                </a:gridCol>
+              </a:tblGrid>
+              <a:tr h="3090498">
+                <a:tc>
+                  <a:txBody>
+                    <a:bodyPr/>
+                    <a:lstStyle/>
+                    <a:p>
+                      <a:r>
+                        <a:rPr lang="en-US" u="sng" dirty="0" smtClean="0">
+                          <a:solidFill>
+                            <a:srgbClr val="000000"/>
+                          </a:solidFill>
+                        </a:rPr>
+                        <a:t>Gold Sponsors</a:t>
+                      </a:r>
+                      <a:endParaRPr lang="en-US" u="sng" dirty="0">
+                        <a:solidFill>
+                          <a:srgbClr val="000000"/>
+                        </a:solidFill>
+                      </a:endParaRPr>
+                    </a:p>
+                  </a:txBody>
+                  <a:tcPr>
+                    <a:lnL w="12700" cap="flat" cmpd="sng" algn="ctr">
+                      <a:solidFill>
+                        <a:scrgbClr r="0" g="0" b="0"/>
+                      </a:solidFill>
+                      <a:prstDash val="solid"/>
+                      <a:round/>
+                      <a:headEnd type="none" w="med" len="med"/>
+                      <a:tailEnd type="none" w="med" len="med"/>
+                    </a:lnL>
+                    <a:lnR w="12700" cap="flat" cmpd="sng" algn="ctr">
+                      <a:solidFill>
+                        <a:scrgbClr r="0" g="0" b="0"/>
+                      </a:solidFill>
+                      <a:prstDash val="solid"/>
+                      <a:round/>
+                      <a:headEnd type="none" w="med" len="med"/>
+                      <a:tailEnd type="none" w="med" len="med"/>
+                    </a:lnR>
+                    <a:lnT w="12700" cap="flat" cmpd="sng" algn="ctr">
+                      <a:solidFill>
+                        <a:scrgbClr r="0" g="0" b="0"/>
+                      </a:solidFill>
+                      <a:prstDash val="solid"/>
+                      <a:round/>
+                      <a:headEnd type="none" w="med" len="med"/>
+                      <a:tailEnd type="none" w="med" len="med"/>
+                    </a:lnT>
+                    <a:lnB w="12700" cap="flat" cmpd="sng" algn="ctr">
+                      <a:solidFill>
+                        <a:scrgbClr r="0" g="0" b="0"/>
+                      </a:solidFill>
+                      <a:prstDash val="solid"/>
+                      <a:round/>
+                      <a:headEnd type="none" w="med" len="med"/>
+                      <a:tailEnd type="none" w="med" len="med"/>
+                    </a:lnB>
+                    <a:solidFill>
+                      <a:srgbClr val="FFFFFF"/>
+                    </a:solidFill>
+                  </a:tcPr>
+                </a:tc>
+                <a:extLst>
+                  <a:ext uri="{0D108BD9-81ED-4DB2-BD59-A6C34878D82A}">
+                    <a16:rowId xmlns:a16="http://schemas.microsoft.com/office/drawing/2014/main" val="10000"/>
+                  </a:ext>
+                </a:extLst>
+              </a:tr>
+            </a:tbl>
+          </a:graphicData>
+        </a:graphic>
+      </p:graphicFrame>
+      <p:pic>
+        <p:nvPicPr>
+          <p:cNvPr id="12" name="Picture 11" descr="Advantage Tech.png"/>
+          <p:cNvPicPr>
+            <a:picLocks noChangeAspect="1"/>
+          </p:cNvPicPr>
+          <p:nvPr/>
+        </p:nvPicPr>
+        <p:blipFill>
+          <a:blip r:embed="rId6">
+            <a:extLst>
+              <a:ext uri="{28A0092B-C50C-407E-A947-70E740481C1C}">
+                <a14:useLocalDpi xmlns:a14="http://schemas.microsoft.com/office/drawing/2010/main" val="0"/>
+              </a:ext>
+            </a:extLst>
+          </a:blip>
+          <a:stretch>
+            <a:fillRect/>
+          </a:stretch>
+        </p:blipFill>
+        <p:spPr>
+          <a:xfrm>
+            <a:off x="8581915" y="3732506"/>
+            <a:ext cx="1569826" cy="514903"/>
+          </a:xfrm>
+          <a:prstGeom prst="rect">
+            <a:avLst/>
+          </a:prstGeom>
+        </p:spPr>
+      </p:pic>
+      <p:pic>
+        <p:nvPicPr>
+          <p:cNvPr id="13" name="Picture 12" descr="Bradford and Galt.png"/>
+          <p:cNvPicPr>
+            <a:picLocks noChangeAspect="1"/>
+          </p:cNvPicPr>
+          <p:nvPr/>
+        </p:nvPicPr>
+        <p:blipFill>
+          <a:blip r:embed="rId7" cstate="print">
+            <a:extLst>
+              <a:ext uri="{28A0092B-C50C-407E-A947-70E740481C1C}">
+                <a14:useLocalDpi xmlns:a14="http://schemas.microsoft.com/office/drawing/2010/main" val="0"/>
+              </a:ext>
+            </a:extLst>
+          </a:blip>
+          <a:stretch>
+            <a:fillRect/>
+          </a:stretch>
+        </p:blipFill>
+        <p:spPr>
+          <a:xfrm>
+            <a:off x="10572903" y="4601987"/>
+            <a:ext cx="861694" cy="590876"/>
+          </a:xfrm>
+          <a:prstGeom prst="rect">
+            <a:avLst/>
+          </a:prstGeom>
+        </p:spPr>
+      </p:pic>
+      <p:pic>
+        <p:nvPicPr>
+          <p:cNvPr id="14" name="Picture 13" descr="Centriq Training.png"/>
+          <p:cNvPicPr>
+            <a:picLocks noChangeAspect="1"/>
+          </p:cNvPicPr>
+          <p:nvPr/>
+        </p:nvPicPr>
+        <p:blipFill>
+          <a:blip r:embed="rId8" cstate="print">
+            <a:extLst>
+              <a:ext uri="{28A0092B-C50C-407E-A947-70E740481C1C}">
+                <a14:useLocalDpi xmlns:a14="http://schemas.microsoft.com/office/drawing/2010/main" val="0"/>
+              </a:ext>
+            </a:extLst>
+          </a:blip>
+          <a:stretch>
+            <a:fillRect/>
+          </a:stretch>
+        </p:blipFill>
+        <p:spPr>
+          <a:xfrm>
+            <a:off x="9536336" y="6108496"/>
+            <a:ext cx="1216306" cy="514903"/>
+          </a:xfrm>
+          <a:prstGeom prst="rect">
+            <a:avLst/>
+          </a:prstGeom>
+        </p:spPr>
+      </p:pic>
+      <p:pic>
+        <p:nvPicPr>
+          <p:cNvPr id="15" name="Picture 14" descr="Cerner.png"/>
+          <p:cNvPicPr>
+            <a:picLocks noChangeAspect="1"/>
+          </p:cNvPicPr>
+          <p:nvPr/>
+        </p:nvPicPr>
+        <p:blipFill>
+          <a:blip r:embed="rId9">
+            <a:extLst>
+              <a:ext uri="{28A0092B-C50C-407E-A947-70E740481C1C}">
+                <a14:useLocalDpi xmlns:a14="http://schemas.microsoft.com/office/drawing/2010/main" val="0"/>
+              </a:ext>
+            </a:extLst>
+          </a:blip>
+          <a:stretch>
+            <a:fillRect/>
+          </a:stretch>
+        </p:blipFill>
+        <p:spPr>
+          <a:xfrm>
+            <a:off x="5408168" y="5018755"/>
+            <a:ext cx="1587892" cy="431000"/>
+          </a:xfrm>
+          <a:prstGeom prst="rect">
+            <a:avLst/>
+          </a:prstGeom>
+        </p:spPr>
+      </p:pic>
+      <p:pic>
+        <p:nvPicPr>
+          <p:cNvPr id="16" name="Picture 15" descr="DSI.png"/>
+          <p:cNvPicPr>
+            <a:picLocks noChangeAspect="1"/>
+          </p:cNvPicPr>
+          <p:nvPr/>
+        </p:nvPicPr>
+        <p:blipFill>
+          <a:blip r:embed="rId10" cstate="print">
+            <a:extLst>
+              <a:ext uri="{28A0092B-C50C-407E-A947-70E740481C1C}">
+                <a14:useLocalDpi xmlns:a14="http://schemas.microsoft.com/office/drawing/2010/main" val="0"/>
+              </a:ext>
+            </a:extLst>
+          </a:blip>
+          <a:stretch>
+            <a:fillRect/>
+          </a:stretch>
+        </p:blipFill>
+        <p:spPr>
+          <a:xfrm>
+            <a:off x="2698591" y="5300121"/>
+            <a:ext cx="1209501" cy="393171"/>
+          </a:xfrm>
+          <a:prstGeom prst="rect">
+            <a:avLst/>
+          </a:prstGeom>
+        </p:spPr>
+      </p:pic>
+      <p:pic>
+        <p:nvPicPr>
+          <p:cNvPr id="17" name="Picture 16" descr="Garmin.png"/>
+          <p:cNvPicPr>
+            <a:picLocks noChangeAspect="1"/>
+          </p:cNvPicPr>
+          <p:nvPr/>
+        </p:nvPicPr>
+        <p:blipFill>
+          <a:blip r:embed="rId11">
+            <a:extLst>
+              <a:ext uri="{28A0092B-C50C-407E-A947-70E740481C1C}">
+                <a14:useLocalDpi xmlns:a14="http://schemas.microsoft.com/office/drawing/2010/main" val="0"/>
+              </a:ext>
+            </a:extLst>
+          </a:blip>
+          <a:stretch>
+            <a:fillRect/>
+          </a:stretch>
+        </p:blipFill>
+        <p:spPr>
+          <a:xfrm>
+            <a:off x="6750431" y="4321366"/>
+            <a:ext cx="1496173" cy="406104"/>
+          </a:xfrm>
+          <a:prstGeom prst="rect">
+            <a:avLst/>
+          </a:prstGeom>
+        </p:spPr>
+      </p:pic>
+      <p:pic>
+        <p:nvPicPr>
+          <p:cNvPr id="18" name="Picture 17" descr="Keyhole Software.png"/>
+          <p:cNvPicPr>
+            <a:picLocks noChangeAspect="1"/>
+          </p:cNvPicPr>
+          <p:nvPr/>
+        </p:nvPicPr>
+        <p:blipFill>
+          <a:blip r:embed="rId12">
+            <a:extLst>
+              <a:ext uri="{28A0092B-C50C-407E-A947-70E740481C1C}">
+                <a14:useLocalDpi xmlns:a14="http://schemas.microsoft.com/office/drawing/2010/main" val="0"/>
+              </a:ext>
+            </a:extLst>
+          </a:blip>
+          <a:stretch>
+            <a:fillRect/>
+          </a:stretch>
+        </p:blipFill>
+        <p:spPr>
+          <a:xfrm>
+            <a:off x="10225690" y="3694404"/>
+            <a:ext cx="1259866" cy="455952"/>
+          </a:xfrm>
+          <a:prstGeom prst="rect">
+            <a:avLst/>
+          </a:prstGeom>
+        </p:spPr>
+      </p:pic>
+      <p:pic>
+        <p:nvPicPr>
+          <p:cNvPr id="19" name="Picture 18" descr="KU Edwards Campus.png"/>
+          <p:cNvPicPr>
+            <a:picLocks noChangeAspect="1"/>
+          </p:cNvPicPr>
+          <p:nvPr/>
+        </p:nvPicPr>
+        <p:blipFill>
+          <a:blip r:embed="rId13" cstate="print">
+            <a:extLst>
+              <a:ext uri="{28A0092B-C50C-407E-A947-70E740481C1C}">
+                <a14:useLocalDpi xmlns:a14="http://schemas.microsoft.com/office/drawing/2010/main" val="0"/>
+              </a:ext>
+            </a:extLst>
+          </a:blip>
+          <a:stretch>
+            <a:fillRect/>
+          </a:stretch>
+        </p:blipFill>
+        <p:spPr>
+          <a:xfrm>
+            <a:off x="10199812" y="1970728"/>
+            <a:ext cx="1365119" cy="1092095"/>
+          </a:xfrm>
+          <a:prstGeom prst="rect">
+            <a:avLst/>
+          </a:prstGeom>
+        </p:spPr>
+      </p:pic>
+      <p:pic>
+        <p:nvPicPr>
+          <p:cNvPr id="20" name="Picture 19" descr="LRS Consulting Services.png"/>
+          <p:cNvPicPr>
+            <a:picLocks noChangeAspect="1"/>
+          </p:cNvPicPr>
+          <p:nvPr/>
+        </p:nvPicPr>
+        <p:blipFill>
+          <a:blip r:embed="rId14">
+            <a:extLst>
+              <a:ext uri="{28A0092B-C50C-407E-A947-70E740481C1C}">
+                <a14:useLocalDpi xmlns:a14="http://schemas.microsoft.com/office/drawing/2010/main" val="0"/>
+              </a:ext>
+            </a:extLst>
+          </a:blip>
+          <a:stretch>
+            <a:fillRect/>
+          </a:stretch>
+        </p:blipFill>
+        <p:spPr>
+          <a:xfrm>
+            <a:off x="5215805" y="3883969"/>
+            <a:ext cx="1412385" cy="470795"/>
+          </a:xfrm>
+          <a:prstGeom prst="rect">
+            <a:avLst/>
+          </a:prstGeom>
+        </p:spPr>
+      </p:pic>
+      <p:pic>
+        <p:nvPicPr>
+          <p:cNvPr id="21" name="Picture 20" descr="Multi Service.png"/>
+          <p:cNvPicPr>
+            <a:picLocks noChangeAspect="1"/>
+          </p:cNvPicPr>
+          <p:nvPr/>
+        </p:nvPicPr>
+        <p:blipFill>
+          <a:blip r:embed="rId15">
+            <a:extLst>
+              <a:ext uri="{28A0092B-C50C-407E-A947-70E740481C1C}">
+                <a14:useLocalDpi xmlns:a14="http://schemas.microsoft.com/office/drawing/2010/main" val="0"/>
+              </a:ext>
+            </a:extLst>
+          </a:blip>
+          <a:stretch>
+            <a:fillRect/>
+          </a:stretch>
+        </p:blipFill>
+        <p:spPr>
+          <a:xfrm>
+            <a:off x="7393036" y="2763429"/>
+            <a:ext cx="2787220" cy="374284"/>
+          </a:xfrm>
+          <a:prstGeom prst="rect">
+            <a:avLst/>
+          </a:prstGeom>
+        </p:spPr>
+      </p:pic>
+      <p:pic>
+        <p:nvPicPr>
+          <p:cNvPr id="22" name="Picture 21" descr="Netchemia.png"/>
+          <p:cNvPicPr>
+            <a:picLocks noChangeAspect="1"/>
+          </p:cNvPicPr>
+          <p:nvPr/>
+        </p:nvPicPr>
+        <p:blipFill>
+          <a:blip r:embed="rId16">
+            <a:extLst>
+              <a:ext uri="{28A0092B-C50C-407E-A947-70E740481C1C}">
+                <a14:useLocalDpi xmlns:a14="http://schemas.microsoft.com/office/drawing/2010/main" val="0"/>
+              </a:ext>
+            </a:extLst>
+          </a:blip>
+          <a:stretch>
+            <a:fillRect/>
+          </a:stretch>
+        </p:blipFill>
+        <p:spPr>
+          <a:xfrm>
+            <a:off x="6755485" y="3749232"/>
+            <a:ext cx="1847283" cy="401124"/>
+          </a:xfrm>
+          <a:prstGeom prst="rect">
+            <a:avLst/>
+          </a:prstGeom>
+        </p:spPr>
+      </p:pic>
+      <p:pic>
+        <p:nvPicPr>
+          <p:cNvPr id="23" name="Picture 22" descr="Oakwood Systems.png"/>
+          <p:cNvPicPr>
+            <a:picLocks noChangeAspect="1"/>
+          </p:cNvPicPr>
+          <p:nvPr/>
+        </p:nvPicPr>
+        <p:blipFill>
+          <a:blip r:embed="rId17">
+            <a:extLst>
+              <a:ext uri="{28A0092B-C50C-407E-A947-70E740481C1C}">
+                <a14:useLocalDpi xmlns:a14="http://schemas.microsoft.com/office/drawing/2010/main" val="0"/>
+              </a:ext>
+            </a:extLst>
+          </a:blip>
+          <a:stretch>
+            <a:fillRect/>
+          </a:stretch>
+        </p:blipFill>
+        <p:spPr>
+          <a:xfrm>
+            <a:off x="3474564" y="4753935"/>
+            <a:ext cx="1741241" cy="437798"/>
+          </a:xfrm>
+          <a:prstGeom prst="rect">
+            <a:avLst/>
+          </a:prstGeom>
+        </p:spPr>
+      </p:pic>
+      <p:pic>
+        <p:nvPicPr>
+          <p:cNvPr id="24" name="Picture 23" descr="Perceptive Software.png"/>
+          <p:cNvPicPr>
+            <a:picLocks noChangeAspect="1"/>
+          </p:cNvPicPr>
+          <p:nvPr/>
+        </p:nvPicPr>
+        <p:blipFill>
+          <a:blip r:embed="rId18">
+            <a:extLst>
+              <a:ext uri="{28A0092B-C50C-407E-A947-70E740481C1C}">
+                <a14:useLocalDpi xmlns:a14="http://schemas.microsoft.com/office/drawing/2010/main" val="0"/>
+              </a:ext>
+            </a:extLst>
+          </a:blip>
+          <a:stretch>
+            <a:fillRect/>
+          </a:stretch>
+        </p:blipFill>
+        <p:spPr>
+          <a:xfrm>
+            <a:off x="4938383" y="2040521"/>
+            <a:ext cx="2682521" cy="485409"/>
+          </a:xfrm>
+          <a:prstGeom prst="rect">
+            <a:avLst/>
+          </a:prstGeom>
+        </p:spPr>
+      </p:pic>
+      <p:pic>
+        <p:nvPicPr>
+          <p:cNvPr id="25" name="Picture 24" descr="Stackify.png"/>
+          <p:cNvPicPr>
+            <a:picLocks noChangeAspect="1"/>
+          </p:cNvPicPr>
+          <p:nvPr/>
+        </p:nvPicPr>
+        <p:blipFill>
+          <a:blip r:embed="rId19" cstate="print">
+            <a:extLst>
+              <a:ext uri="{28A0092B-C50C-407E-A947-70E740481C1C}">
+                <a14:useLocalDpi xmlns:a14="http://schemas.microsoft.com/office/drawing/2010/main" val="0"/>
+              </a:ext>
+            </a:extLst>
+          </a:blip>
+          <a:stretch>
+            <a:fillRect/>
+          </a:stretch>
+        </p:blipFill>
+        <p:spPr>
+          <a:xfrm>
+            <a:off x="5273645" y="4524418"/>
+            <a:ext cx="1120237" cy="374479"/>
+          </a:xfrm>
+          <a:prstGeom prst="rect">
+            <a:avLst/>
+          </a:prstGeom>
+        </p:spPr>
+      </p:pic>
+      <p:pic>
+        <p:nvPicPr>
+          <p:cNvPr id="26" name="Picture 25" descr="UnitedLex.png"/>
+          <p:cNvPicPr>
+            <a:picLocks noChangeAspect="1"/>
+          </p:cNvPicPr>
+          <p:nvPr/>
+        </p:nvPicPr>
+        <p:blipFill>
+          <a:blip r:embed="rId20" cstate="print">
+            <a:extLst>
+              <a:ext uri="{28A0092B-C50C-407E-A947-70E740481C1C}">
+                <a14:useLocalDpi xmlns:a14="http://schemas.microsoft.com/office/drawing/2010/main" val="0"/>
+              </a:ext>
+            </a:extLst>
+          </a:blip>
+          <a:stretch>
+            <a:fillRect/>
+          </a:stretch>
+        </p:blipFill>
+        <p:spPr>
+          <a:xfrm>
+            <a:off x="9298119" y="5256577"/>
+            <a:ext cx="1315837" cy="323320"/>
+          </a:xfrm>
+          <a:prstGeom prst="rect">
+            <a:avLst/>
+          </a:prstGeom>
+        </p:spPr>
+      </p:pic>
+      <p:pic>
+        <p:nvPicPr>
+          <p:cNvPr id="27" name="Picture 26" descr="databank.png"/>
+          <p:cNvPicPr>
+            <a:picLocks noChangeAspect="1"/>
+          </p:cNvPicPr>
+          <p:nvPr/>
+        </p:nvPicPr>
+        <p:blipFill>
+          <a:blip r:embed="rId21" cstate="print">
+            <a:extLst>
+              <a:ext uri="{28A0092B-C50C-407E-A947-70E740481C1C}">
+                <a14:useLocalDpi xmlns:a14="http://schemas.microsoft.com/office/drawing/2010/main" val="0"/>
+              </a:ext>
+            </a:extLst>
+          </a:blip>
+          <a:stretch>
+            <a:fillRect/>
+          </a:stretch>
+        </p:blipFill>
+        <p:spPr>
+          <a:xfrm>
+            <a:off x="2636680" y="659946"/>
+            <a:ext cx="2750059" cy="889198"/>
+          </a:xfrm>
+          <a:prstGeom prst="rect">
+            <a:avLst/>
+          </a:prstGeom>
+        </p:spPr>
+      </p:pic>
+      <p:pic>
+        <p:nvPicPr>
+          <p:cNvPr id="28" name="Picture 27" descr="DST.png"/>
+          <p:cNvPicPr>
+            <a:picLocks noChangeAspect="1"/>
+          </p:cNvPicPr>
+          <p:nvPr/>
+        </p:nvPicPr>
+        <p:blipFill>
+          <a:blip r:embed="rId22" cstate="print">
+            <a:extLst>
+              <a:ext uri="{28A0092B-C50C-407E-A947-70E740481C1C}">
+                <a14:useLocalDpi xmlns:a14="http://schemas.microsoft.com/office/drawing/2010/main" val="0"/>
+              </a:ext>
+            </a:extLst>
+          </a:blip>
+          <a:stretch>
+            <a:fillRect/>
+          </a:stretch>
+        </p:blipFill>
+        <p:spPr>
+          <a:xfrm>
+            <a:off x="4318714" y="3765723"/>
+            <a:ext cx="736663" cy="662997"/>
+          </a:xfrm>
+          <a:prstGeom prst="rect">
+            <a:avLst/>
+          </a:prstGeom>
+        </p:spPr>
+      </p:pic>
+      <p:pic>
+        <p:nvPicPr>
+          <p:cNvPr id="29" name="Picture 28" descr="Balance Innovations.png"/>
+          <p:cNvPicPr>
+            <a:picLocks noChangeAspect="1"/>
+          </p:cNvPicPr>
+          <p:nvPr/>
+        </p:nvPicPr>
+        <p:blipFill>
+          <a:blip r:embed="rId23" cstate="print">
+            <a:extLst>
+              <a:ext uri="{28A0092B-C50C-407E-A947-70E740481C1C}">
+                <a14:useLocalDpi xmlns:a14="http://schemas.microsoft.com/office/drawing/2010/main" val="0"/>
+              </a:ext>
+            </a:extLst>
+          </a:blip>
+          <a:stretch>
+            <a:fillRect/>
+          </a:stretch>
+        </p:blipFill>
+        <p:spPr>
+          <a:xfrm>
+            <a:off x="2783432" y="4150356"/>
+            <a:ext cx="801974" cy="634177"/>
+          </a:xfrm>
+          <a:prstGeom prst="rect">
+            <a:avLst/>
+          </a:prstGeom>
+        </p:spPr>
+      </p:pic>
+      <p:pic>
+        <p:nvPicPr>
+          <p:cNvPr id="30" name="Picture 29" descr="Jack Henry And Associates.png"/>
+          <p:cNvPicPr>
+            <a:picLocks noChangeAspect="1"/>
+          </p:cNvPicPr>
+          <p:nvPr/>
+        </p:nvPicPr>
+        <p:blipFill>
+          <a:blip r:embed="rId24">
+            <a:extLst>
+              <a:ext uri="{28A0092B-C50C-407E-A947-70E740481C1C}">
+                <a14:useLocalDpi xmlns:a14="http://schemas.microsoft.com/office/drawing/2010/main" val="0"/>
+              </a:ext>
+            </a:extLst>
+          </a:blip>
+          <a:stretch>
+            <a:fillRect/>
+          </a:stretch>
+        </p:blipFill>
+        <p:spPr>
+          <a:xfrm>
+            <a:off x="7187686" y="5026425"/>
+            <a:ext cx="1652218" cy="391812"/>
+          </a:xfrm>
+          <a:prstGeom prst="rect">
+            <a:avLst/>
+          </a:prstGeom>
+        </p:spPr>
+      </p:pic>
+      <p:pic>
+        <p:nvPicPr>
+          <p:cNvPr id="31" name="Picture 30" descr="PinsightLogo-v2.png"/>
+          <p:cNvPicPr>
+            <a:picLocks noChangeAspect="1"/>
+          </p:cNvPicPr>
+          <p:nvPr/>
+        </p:nvPicPr>
+        <p:blipFill>
+          <a:blip r:embed="rId25" cstate="print">
+            <a:extLst>
+              <a:ext uri="{28A0092B-C50C-407E-A947-70E740481C1C}">
+                <a14:useLocalDpi xmlns:a14="http://schemas.microsoft.com/office/drawing/2010/main" val="0"/>
+              </a:ext>
+            </a:extLst>
+          </a:blip>
+          <a:stretch>
+            <a:fillRect/>
+          </a:stretch>
+        </p:blipFill>
+        <p:spPr>
+          <a:xfrm>
+            <a:off x="2698591" y="2218175"/>
+            <a:ext cx="1988455" cy="1286647"/>
+          </a:xfrm>
+          <a:prstGeom prst="rect">
+            <a:avLst/>
+          </a:prstGeom>
+        </p:spPr>
+      </p:pic>
+      <p:pic>
+        <p:nvPicPr>
+          <p:cNvPr id="32" name="Picture 31"/>
+          <p:cNvPicPr>
+            <a:picLocks noChangeAspect="1"/>
+          </p:cNvPicPr>
+          <p:nvPr/>
+        </p:nvPicPr>
+        <p:blipFill>
+          <a:blip r:embed="rId26"/>
+          <a:stretch>
+            <a:fillRect/>
+          </a:stretch>
+        </p:blipFill>
+        <p:spPr>
+          <a:xfrm>
+            <a:off x="4862456" y="2640491"/>
+            <a:ext cx="2197104" cy="528972"/>
+          </a:xfrm>
+          <a:prstGeom prst="rect">
+            <a:avLst/>
+          </a:prstGeom>
+        </p:spPr>
+      </p:pic>
+      <p:pic>
+        <p:nvPicPr>
+          <p:cNvPr id="33" name="Picture 32" descr="fitbark.png"/>
+          <p:cNvPicPr>
+            <a:picLocks noChangeAspect="1"/>
+          </p:cNvPicPr>
+          <p:nvPr/>
+        </p:nvPicPr>
+        <p:blipFill>
+          <a:blip r:embed="rId27" cstate="print">
+            <a:extLst>
+              <a:ext uri="{28A0092B-C50C-407E-A947-70E740481C1C}">
+                <a14:useLocalDpi xmlns:a14="http://schemas.microsoft.com/office/drawing/2010/main" val="0"/>
+              </a:ext>
+            </a:extLst>
+          </a:blip>
+          <a:stretch>
+            <a:fillRect/>
+          </a:stretch>
+        </p:blipFill>
+        <p:spPr>
+          <a:xfrm>
+            <a:off x="4126131" y="5284982"/>
+            <a:ext cx="1147514" cy="635391"/>
+          </a:xfrm>
+          <a:prstGeom prst="rect">
+            <a:avLst/>
+          </a:prstGeom>
+        </p:spPr>
+      </p:pic>
+      <p:pic>
+        <p:nvPicPr>
+          <p:cNvPr id="34" name="Picture 33" descr="BATS_CMYK_Glow.eps"/>
+          <p:cNvPicPr>
+            <a:picLocks noChangeAspect="1"/>
+          </p:cNvPicPr>
+          <p:nvPr/>
+        </p:nvPicPr>
+        <p:blipFill>
+          <a:blip r:embed="rId28" cstate="print">
+            <a:extLst>
+              <a:ext uri="{28A0092B-C50C-407E-A947-70E740481C1C}">
+                <a14:useLocalDpi xmlns:a14="http://schemas.microsoft.com/office/drawing/2010/main" val="0"/>
+              </a:ext>
+            </a:extLst>
+          </a:blip>
+          <a:stretch>
+            <a:fillRect/>
+          </a:stretch>
+        </p:blipFill>
+        <p:spPr>
+          <a:xfrm>
+            <a:off x="10225690" y="5649133"/>
+            <a:ext cx="1333815" cy="481284"/>
+          </a:xfrm>
+          <a:prstGeom prst="rect">
+            <a:avLst/>
+          </a:prstGeom>
+        </p:spPr>
+      </p:pic>
+      <p:pic>
+        <p:nvPicPr>
+          <p:cNvPr id="35" name="Picture 34" descr="2011_Commerce_4C.PNG"/>
+          <p:cNvPicPr>
+            <a:picLocks noChangeAspect="1"/>
+          </p:cNvPicPr>
+          <p:nvPr/>
+        </p:nvPicPr>
+        <p:blipFill>
+          <a:blip r:embed="rId29" cstate="print">
+            <a:extLst>
+              <a:ext uri="{28A0092B-C50C-407E-A947-70E740481C1C}">
+                <a14:useLocalDpi xmlns:a14="http://schemas.microsoft.com/office/drawing/2010/main" val="0"/>
+              </a:ext>
+            </a:extLst>
+          </a:blip>
+          <a:stretch>
+            <a:fillRect/>
+          </a:stretch>
+        </p:blipFill>
+        <p:spPr>
+          <a:xfrm>
+            <a:off x="5749193" y="5557725"/>
+            <a:ext cx="2586091" cy="408545"/>
+          </a:xfrm>
+          <a:prstGeom prst="rect">
+            <a:avLst/>
+          </a:prstGeom>
+        </p:spPr>
+      </p:pic>
+      <p:pic>
+        <p:nvPicPr>
+          <p:cNvPr id="36" name="Picture 35" descr="0 PRIMARY_2014 Liferay Logo Horizontal Full Color - Light BG (1).eps"/>
+          <p:cNvPicPr>
+            <a:picLocks noChangeAspect="1"/>
+          </p:cNvPicPr>
+          <p:nvPr/>
+        </p:nvPicPr>
+        <p:blipFill>
+          <a:blip r:embed="rId30" cstate="print">
+            <a:extLst>
+              <a:ext uri="{28A0092B-C50C-407E-A947-70E740481C1C}">
+                <a14:useLocalDpi xmlns:a14="http://schemas.microsoft.com/office/drawing/2010/main" val="0"/>
+              </a:ext>
+            </a:extLst>
+          </a:blip>
+          <a:stretch>
+            <a:fillRect/>
+          </a:stretch>
+        </p:blipFill>
+        <p:spPr>
+          <a:xfrm>
+            <a:off x="2813401" y="6265401"/>
+            <a:ext cx="1537023" cy="344666"/>
+          </a:xfrm>
+          <a:prstGeom prst="rect">
+            <a:avLst/>
+          </a:prstGeom>
+        </p:spPr>
+      </p:pic>
+      <p:pic>
+        <p:nvPicPr>
+          <p:cNvPr id="37" name="Picture 36" descr="triplei-vert-purple-600px.png"/>
+          <p:cNvPicPr>
+            <a:picLocks noChangeAspect="1"/>
+          </p:cNvPicPr>
+          <p:nvPr/>
+        </p:nvPicPr>
+        <p:blipFill>
+          <a:blip r:embed="rId31" cstate="print">
+            <a:extLst>
+              <a:ext uri="{28A0092B-C50C-407E-A947-70E740481C1C}">
+                <a14:useLocalDpi xmlns:a14="http://schemas.microsoft.com/office/drawing/2010/main" val="0"/>
+              </a:ext>
+            </a:extLst>
+          </a:blip>
+          <a:stretch>
+            <a:fillRect/>
+          </a:stretch>
+        </p:blipFill>
+        <p:spPr>
+          <a:xfrm>
+            <a:off x="8578301" y="5648175"/>
+            <a:ext cx="807244" cy="691539"/>
+          </a:xfrm>
+          <a:prstGeom prst="rect">
+            <a:avLst/>
+          </a:prstGeom>
+        </p:spPr>
+      </p:pic>
+      <p:pic>
+        <p:nvPicPr>
+          <p:cNvPr id="38" name="Picture 37" descr="imodules-LgNoTagNoBgLogo2012.png"/>
+          <p:cNvPicPr>
+            <a:picLocks noChangeAspect="1"/>
+          </p:cNvPicPr>
+          <p:nvPr/>
+        </p:nvPicPr>
+        <p:blipFill>
+          <a:blip r:embed="rId32" cstate="print">
+            <a:extLst>
+              <a:ext uri="{28A0092B-C50C-407E-A947-70E740481C1C}">
+                <a14:useLocalDpi xmlns:a14="http://schemas.microsoft.com/office/drawing/2010/main" val="0"/>
+              </a:ext>
+            </a:extLst>
+          </a:blip>
+          <a:stretch>
+            <a:fillRect/>
+          </a:stretch>
+        </p:blipFill>
+        <p:spPr>
+          <a:xfrm>
+            <a:off x="4695898" y="6149551"/>
+            <a:ext cx="1793914" cy="445217"/>
+          </a:xfrm>
+          <a:prstGeom prst="rect">
+            <a:avLst/>
+          </a:prstGeom>
+        </p:spPr>
+      </p:pic>
+      <p:pic>
+        <p:nvPicPr>
+          <p:cNvPr id="39" name="Picture 38" descr="ecco logo - general.jpg"/>
+          <p:cNvPicPr>
+            <a:picLocks noChangeAspect="1"/>
+          </p:cNvPicPr>
+          <p:nvPr/>
+        </p:nvPicPr>
+        <p:blipFill>
+          <a:blip r:embed="rId33" cstate="print">
+            <a:extLst>
+              <a:ext uri="{28A0092B-C50C-407E-A947-70E740481C1C}">
+                <a14:useLocalDpi xmlns:a14="http://schemas.microsoft.com/office/drawing/2010/main" val="0"/>
+              </a:ext>
+            </a:extLst>
+          </a:blip>
+          <a:stretch>
+            <a:fillRect/>
+          </a:stretch>
+        </p:blipFill>
+        <p:spPr>
+          <a:xfrm>
+            <a:off x="6628190" y="6088662"/>
+            <a:ext cx="1722623" cy="506106"/>
+          </a:xfrm>
+          <a:prstGeom prst="rect">
+            <a:avLst/>
+          </a:prstGeom>
+        </p:spPr>
+      </p:pic>
+      <p:pic>
+        <p:nvPicPr>
+          <p:cNvPr id="40" name="Picture 39" descr="NDBHLogoColorWithTagline.jpg"/>
+          <p:cNvPicPr>
+            <a:picLocks noChangeAspect="1"/>
+          </p:cNvPicPr>
+          <p:nvPr/>
+        </p:nvPicPr>
+        <p:blipFill>
+          <a:blip r:embed="rId34" cstate="print">
+            <a:extLst>
+              <a:ext uri="{28A0092B-C50C-407E-A947-70E740481C1C}">
+                <a14:useLocalDpi xmlns:a14="http://schemas.microsoft.com/office/drawing/2010/main" val="0"/>
+              </a:ext>
+            </a:extLst>
+          </a:blip>
+          <a:stretch>
+            <a:fillRect/>
+          </a:stretch>
+        </p:blipFill>
+        <p:spPr>
+          <a:xfrm>
+            <a:off x="8835569" y="4389773"/>
+            <a:ext cx="1538435" cy="596692"/>
+          </a:xfrm>
+          <a:prstGeom prst="rect">
+            <a:avLst/>
+          </a:prstGeom>
+        </p:spPr>
+      </p:pic>
+    </p:spTree>
+    <p:extLst>
+      <p:ext uri="{BB962C8B-B14F-4D97-AF65-F5344CB8AC3E}">
+        <p14:creationId xmlns:p14="http://schemas.microsoft.com/office/powerpoint/2010/main" val="1167636605"/>
+      </p:ext>
+    </p:extLst>
+  </p:cSld>
+  <p:clrMapOvr>
+    <a:masterClrMapping/>
+  </p:clrMapOvr>
+  <mc:AlternateContent xmlns:mc="http://schemas.openxmlformats.org/markup-compatibility/2006" xmlns:p14="http://schemas.microsoft.com/office/powerpoint/2010/main">
+    <mc:Choice Requires="p14">
+      <p:transition p14:dur="0"/>
+    </mc:Choice>
+    <mc:Fallback xmlns="">
+      <p:transition/>
+    </mc:Fallback>
+  </mc:AlternateContent>
+  <p:timing>
+    <p:tnLst>
+      <p:par>
+        <p:cTn id="1" dur="indefinite" restart="never" nodeType="tmRoot"/>
+      </p:par>
+    </p:tnLst>
+  </p:timing>
+</p:sld>
+</file>
+
+<file path=ppt/slides/slide3.xml><?xml version="1.0" encoding="utf-8"?>
+<p:sld xmlns:a="http://schemas.openxmlformats.org/drawingml/2006/main" xmlns:r="http://schemas.openxmlformats.org/officeDocument/2006/relationships" xmlns:p="http://schemas.openxmlformats.org/presentationml/2006/main">
+  <p:cSld>
+    <p:spTree>
+      <p:nvGrpSpPr>
+        <p:cNvPr id="1" name=""/>
+        <p:cNvGrpSpPr/>
+        <p:nvPr/>
+      </p:nvGrpSpPr>
+      <p:grpSpPr>
+        <a:xfrm>
+          <a:off x="0" y="0"/>
+          <a:ext cx="0" cy="0"/>
+          <a:chOff x="0" y="0"/>
+          <a:chExt cx="0" cy="0"/>
+        </a:xfrm>
+      </p:grpSpPr>
       <p:sp>
         <p:nvSpPr>
           <p:cNvPr id="2" name="Title 1"/>
@@ -8783,7 +10417,7 @@
 </p:sld>
 </file>
 
-<file path=ppt/slides/slide3.xml><?xml version="1.0" encoding="utf-8"?>
+<file path=ppt/slides/slide4.xml><?xml version="1.0" encoding="utf-8"?>
 <p:sld xmlns:a="http://schemas.openxmlformats.org/drawingml/2006/main" xmlns:r="http://schemas.openxmlformats.org/officeDocument/2006/relationships" xmlns:p="http://schemas.openxmlformats.org/presentationml/2006/main">
   <p:cSld>
     <p:spTree>
@@ -8872,7 +10506,7 @@
 </p:sld>
 </file>
 
-<file path=ppt/slides/slide4.xml><?xml version="1.0" encoding="utf-8"?>
+<file path=ppt/slides/slide5.xml><?xml version="1.0" encoding="utf-8"?>
 <p:sld xmlns:a="http://schemas.openxmlformats.org/drawingml/2006/main" xmlns:r="http://schemas.openxmlformats.org/officeDocument/2006/relationships" xmlns:p="http://schemas.openxmlformats.org/presentationml/2006/main">
   <p:cSld>
     <p:spTree>
@@ -8961,7 +10595,7 @@
 </p:sld>
 </file>
 
-<file path=ppt/slides/slide5.xml><?xml version="1.0" encoding="utf-8"?>
+<file path=ppt/slides/slide6.xml><?xml version="1.0" encoding="utf-8"?>
 <p:sld xmlns:a="http://schemas.openxmlformats.org/drawingml/2006/main" xmlns:r="http://schemas.openxmlformats.org/officeDocument/2006/relationships" xmlns:p="http://schemas.openxmlformats.org/presentationml/2006/main">
   <p:cSld>
     <p:spTree>
@@ -9162,101 +10796,6 @@
 </p:sld>
 </file>
 
-<file path=ppt/slides/slide6.xml><?xml version="1.0" encoding="utf-8"?>
-<p:sld xmlns:a="http://schemas.openxmlformats.org/drawingml/2006/main" xmlns:r="http://schemas.openxmlformats.org/officeDocument/2006/relationships" xmlns:p="http://schemas.openxmlformats.org/presentationml/2006/main">
-  <p:cSld>
-    <p:spTree>
-      <p:nvGrpSpPr>
-        <p:cNvPr id="1" name=""/>
-        <p:cNvGrpSpPr/>
-        <p:nvPr/>
-      </p:nvGrpSpPr>
-      <p:grpSpPr>
-        <a:xfrm>
-          <a:off x="0" y="0"/>
-          <a:ext cx="0" cy="0"/>
-          <a:chOff x="0" y="0"/>
-          <a:chExt cx="0" cy="0"/>
-        </a:xfrm>
-      </p:grpSpPr>
-      <p:sp>
-        <p:nvSpPr>
-          <p:cNvPr id="2" name="Title 1"/>
-          <p:cNvSpPr>
-            <a:spLocks noGrp="1"/>
-          </p:cNvSpPr>
-          <p:nvPr>
-            <p:ph type="title"/>
-          </p:nvPr>
-        </p:nvSpPr>
-        <p:spPr/>
-        <p:txBody>
-          <a:bodyPr/>
-          <a:lstStyle/>
-          <a:p>
-            <a:r>
-              <a:rPr lang="en-US" dirty="0" smtClean="0"/>
-              <a:t>Routing</a:t>
-            </a:r>
-            <a:endParaRPr lang="en-US" dirty="0"/>
-          </a:p>
-        </p:txBody>
-      </p:sp>
-      <p:sp>
-        <p:nvSpPr>
-          <p:cNvPr id="3" name="Content Placeholder 2"/>
-          <p:cNvSpPr>
-            <a:spLocks noGrp="1"/>
-          </p:cNvSpPr>
-          <p:nvPr>
-            <p:ph idx="1"/>
-          </p:nvPr>
-        </p:nvSpPr>
-        <p:spPr/>
-        <p:txBody>
-          <a:bodyPr/>
-          <a:lstStyle/>
-          <a:p>
-            <a:r>
-              <a:rPr lang="en-US" dirty="0" smtClean="0"/>
-              <a:t>Services/{Controller}/[id]</a:t>
-            </a:r>
-          </a:p>
-          <a:p>
-            <a:r>
-              <a:rPr lang="en-US" dirty="0" smtClean="0"/>
-              <a:t>Services/{Controller}/{Action}/[id]</a:t>
-            </a:r>
-          </a:p>
-          <a:p>
-            <a:r>
-              <a:rPr lang="en-US" dirty="0" smtClean="0"/>
-              <a:t>[Attribute]</a:t>
-            </a:r>
-            <a:endParaRPr lang="en-US" dirty="0"/>
-          </a:p>
-        </p:txBody>
-      </p:sp>
-    </p:spTree>
-    <p:extLst>
-      <p:ext uri="{BB962C8B-B14F-4D97-AF65-F5344CB8AC3E}">
-        <p14:creationId xmlns:p14="http://schemas.microsoft.com/office/powerpoint/2010/main" val="2203644204"/>
-      </p:ext>
-    </p:extLst>
-  </p:cSld>
-  <p:clrMapOvr>
-    <a:masterClrMapping/>
-  </p:clrMapOvr>
-  <p:timing>
-    <p:tnLst>
-      <p:par>
-        <p:cTn id="1" dur="indefinite" restart="never" nodeType="tmRoot"/>
-      </p:par>
-    </p:tnLst>
-  </p:timing>
-</p:sld>
-</file>
-
 <file path=ppt/slides/slide7.xml><?xml version="1.0" encoding="utf-8"?>
 <p:sld xmlns:a="http://schemas.openxmlformats.org/drawingml/2006/main" xmlns:r="http://schemas.openxmlformats.org/officeDocument/2006/relationships" xmlns:p="http://schemas.openxmlformats.org/presentationml/2006/main">
   <p:cSld>
@@ -9291,11 +10830,7 @@
           <a:p>
             <a:r>
               <a:rPr lang="en-US" dirty="0" smtClean="0"/>
-              <a:t>Enable </a:t>
-            </a:r>
-            <a:r>
-              <a:rPr lang="en-US" dirty="0" err="1" smtClean="0"/>
-              <a:t>IQueryable</a:t>
+              <a:t>Routing</a:t>
             </a:r>
             <a:endParaRPr lang="en-US" dirty="0"/>
           </a:p>
@@ -9303,544 +10838,43 @@
       </p:sp>
       <p:sp>
         <p:nvSpPr>
-          <p:cNvPr id="4" name="Rectangle 1"/>
-          <p:cNvSpPr>
-            <a:spLocks noGrp="1" noChangeArrowheads="1"/>
+          <p:cNvPr id="3" name="Content Placeholder 2"/>
+          <p:cNvSpPr>
+            <a:spLocks noGrp="1"/>
           </p:cNvSpPr>
           <p:nvPr>
             <p:ph idx="1"/>
           </p:nvPr>
         </p:nvSpPr>
-        <p:spPr bwMode="auto">
-          <a:xfrm>
-            <a:off x="1484310" y="3321159"/>
-            <a:ext cx="8662949" cy="1815882"/>
-          </a:xfrm>
-          <a:prstGeom prst="rect">
-            <a:avLst/>
-          </a:prstGeom>
-          <a:solidFill>
-            <a:srgbClr val="FFFFFF"/>
-          </a:solidFill>
-          <a:ln>
-            <a:noFill/>
-          </a:ln>
-          <a:effectLst/>
-          <a:extLst>
-            <a:ext uri="{91240B29-F687-4F45-9708-019B960494DF}">
-              <a14:hiddenLine xmlns:a14="http://schemas.microsoft.com/office/drawing/2010/main" w="9525">
-                <a:solidFill>
-                  <a:schemeClr val="tx1"/>
-                </a:solidFill>
-                <a:miter lim="800000"/>
-                <a:headEnd/>
-                <a:tailEnd/>
-              </a14:hiddenLine>
-            </a:ext>
-            <a:ext uri="{AF507438-7753-43E0-B8FC-AC1667EBCBE1}">
-              <a14:hiddenEffects xmlns:a14="http://schemas.microsoft.com/office/drawing/2010/main">
-                <a:effectLst>
-                  <a:outerShdw dist="35921" dir="2700000" algn="ctr" rotWithShape="0">
-                    <a:schemeClr val="bg2"/>
-                  </a:outerShdw>
-                </a:effectLst>
-              </a14:hiddenEffects>
-            </a:ext>
-          </a:extLst>
-        </p:spPr>
-        <p:txBody>
-          <a:bodyPr vert="horz" wrap="none" lIns="91440" tIns="45720" rIns="91440" bIns="45720" numCol="1" anchor="ctr" anchorCtr="0" compatLnSpc="1">
-            <a:prstTxWarp prst="textNoShape">
-              <a:avLst/>
-            </a:prstTxWarp>
-            <a:spAutoFit/>
-          </a:bodyPr>
+        <p:spPr/>
+        <p:txBody>
+          <a:bodyPr/>
           <a:lstStyle/>
           <a:p>
-            <a:pPr marL="0" marR="0" lvl="0" indent="0" algn="l" defTabSz="914400" rtl="0" eaLnBrk="0" fontAlgn="base" latinLnBrk="0" hangingPunct="0">
-              <a:lnSpc>
-                <a:spcPct val="100000"/>
-              </a:lnSpc>
-              <a:spcBef>
-                <a:spcPct val="0"/>
-              </a:spcBef>
-              <a:spcAft>
-                <a:spcPct val="0"/>
-              </a:spcAft>
-              <a:buClrTx/>
-              <a:buSzTx/>
-              <a:buFontTx/>
-              <a:buNone/>
-              <a:tabLst/>
-            </a:pPr>
-            <a:r>
-              <a:rPr kumimoji="0" lang="en-US" altLang="en-US" sz="2800" b="0" i="0" u="none" strike="noStrike" cap="none" normalizeH="0" baseline="0" dirty="0" err="1" smtClean="0">
-                <a:ln>
-                  <a:noFill/>
-                </a:ln>
-                <a:solidFill>
-                  <a:srgbClr val="0000FF"/>
-                </a:solidFill>
-                <a:effectLst/>
-                <a:latin typeface="Consolas" panose="020B0609020204030204" pitchFamily="49" charset="0"/>
-                <a:cs typeface="Consolas" panose="020B0609020204030204" pitchFamily="49" charset="0"/>
-              </a:rPr>
-              <a:t>var</a:t>
-            </a:r>
-            <a:r>
-              <a:rPr kumimoji="0" lang="en-US" altLang="en-US" sz="2800" b="0" i="0" u="none" strike="noStrike" cap="none" normalizeH="0" baseline="0" dirty="0" smtClean="0">
-                <a:ln>
-                  <a:noFill/>
-                </a:ln>
-                <a:solidFill>
-                  <a:srgbClr val="000000"/>
-                </a:solidFill>
-                <a:effectLst/>
-                <a:latin typeface="Consolas" panose="020B0609020204030204" pitchFamily="49" charset="0"/>
-                <a:cs typeface="Consolas" panose="020B0609020204030204" pitchFamily="49" charset="0"/>
-              </a:rPr>
-              <a:t> results = </a:t>
-            </a:r>
-            <a:r>
-              <a:rPr kumimoji="0" lang="en-US" altLang="en-US" sz="2800" b="0" i="0" u="none" strike="noStrike" cap="none" normalizeH="0" baseline="0" dirty="0" smtClean="0">
-                <a:ln>
-                  <a:noFill/>
-                </a:ln>
-                <a:solidFill>
-                  <a:srgbClr val="0000FF"/>
-                </a:solidFill>
-                <a:effectLst/>
-                <a:latin typeface="Consolas" panose="020B0609020204030204" pitchFamily="49" charset="0"/>
-                <a:cs typeface="Consolas" panose="020B0609020204030204" pitchFamily="49" charset="0"/>
-              </a:rPr>
-              <a:t>from</a:t>
-            </a:r>
-            <a:r>
-              <a:rPr kumimoji="0" lang="en-US" altLang="en-US" sz="2800" b="0" i="0" u="none" strike="noStrike" cap="none" normalizeH="0" baseline="0" dirty="0" smtClean="0">
-                <a:ln>
-                  <a:noFill/>
-                </a:ln>
-                <a:solidFill>
-                  <a:srgbClr val="000000"/>
-                </a:solidFill>
-                <a:effectLst/>
-                <a:latin typeface="Consolas" panose="020B0609020204030204" pitchFamily="49" charset="0"/>
-                <a:cs typeface="Consolas" panose="020B0609020204030204" pitchFamily="49" charset="0"/>
-              </a:rPr>
-              <a:t> r </a:t>
-            </a:r>
-            <a:r>
-              <a:rPr kumimoji="0" lang="en-US" altLang="en-US" sz="2800" b="0" i="0" u="none" strike="noStrike" cap="none" normalizeH="0" baseline="0" dirty="0" smtClean="0">
-                <a:ln>
-                  <a:noFill/>
-                </a:ln>
-                <a:solidFill>
-                  <a:srgbClr val="0000FF"/>
-                </a:solidFill>
-                <a:effectLst/>
-                <a:latin typeface="Consolas" panose="020B0609020204030204" pitchFamily="49" charset="0"/>
-                <a:cs typeface="Consolas" panose="020B0609020204030204" pitchFamily="49" charset="0"/>
-              </a:rPr>
-              <a:t>in</a:t>
-            </a:r>
-            <a:r>
-              <a:rPr kumimoji="0" lang="en-US" altLang="en-US" sz="2800" b="0" i="0" u="none" strike="noStrike" cap="none" normalizeH="0" baseline="0" dirty="0" smtClean="0">
-                <a:ln>
-                  <a:noFill/>
-                </a:ln>
-                <a:solidFill>
-                  <a:srgbClr val="000000"/>
-                </a:solidFill>
-                <a:effectLst/>
-                <a:latin typeface="Consolas" panose="020B0609020204030204" pitchFamily="49" charset="0"/>
-                <a:cs typeface="Consolas" panose="020B0609020204030204" pitchFamily="49" charset="0"/>
-              </a:rPr>
-              <a:t> </a:t>
-            </a:r>
-            <a:r>
-              <a:rPr kumimoji="0" lang="en-US" altLang="en-US" sz="2800" b="0" i="0" u="none" strike="noStrike" cap="none" normalizeH="0" baseline="0" dirty="0" err="1" smtClean="0">
-                <a:ln>
-                  <a:noFill/>
-                </a:ln>
-                <a:solidFill>
-                  <a:srgbClr val="000000"/>
-                </a:solidFill>
-                <a:effectLst/>
-                <a:latin typeface="Consolas" panose="020B0609020204030204" pitchFamily="49" charset="0"/>
-                <a:cs typeface="Consolas" panose="020B0609020204030204" pitchFamily="49" charset="0"/>
-              </a:rPr>
-              <a:t>db.Recipes</a:t>
-            </a:r>
-            <a:endParaRPr kumimoji="0" lang="en-US" altLang="en-US" sz="2800" b="0" i="0" u="none" strike="noStrike" cap="none" normalizeH="0" baseline="0" dirty="0" smtClean="0">
-              <a:ln>
-                <a:noFill/>
-              </a:ln>
-              <a:solidFill>
-                <a:srgbClr val="000000"/>
-              </a:solidFill>
-              <a:effectLst/>
-              <a:latin typeface="Consolas" panose="020B0609020204030204" pitchFamily="49" charset="0"/>
-              <a:cs typeface="Consolas" panose="020B0609020204030204" pitchFamily="49" charset="0"/>
-            </a:endParaRPr>
-          </a:p>
-          <a:p>
-            <a:pPr marL="0" marR="0" lvl="0" indent="0" algn="l" defTabSz="914400" rtl="0" eaLnBrk="0" fontAlgn="base" latinLnBrk="0" hangingPunct="0">
-              <a:lnSpc>
-                <a:spcPct val="100000"/>
-              </a:lnSpc>
-              <a:spcBef>
-                <a:spcPct val="0"/>
-              </a:spcBef>
-              <a:spcAft>
-                <a:spcPct val="0"/>
-              </a:spcAft>
-              <a:buClrTx/>
-              <a:buSzTx/>
-              <a:buFontTx/>
-              <a:buNone/>
-              <a:tabLst/>
-            </a:pPr>
-            <a:r>
-              <a:rPr kumimoji="0" lang="en-US" altLang="en-US" sz="2800" b="0" i="0" u="none" strike="noStrike" cap="none" normalizeH="0" baseline="0" dirty="0" smtClean="0">
-                <a:ln>
-                  <a:noFill/>
-                </a:ln>
-                <a:solidFill>
-                  <a:srgbClr val="000000"/>
-                </a:solidFill>
-                <a:effectLst/>
-                <a:latin typeface="Consolas" panose="020B0609020204030204" pitchFamily="49" charset="0"/>
-                <a:cs typeface="Consolas" panose="020B0609020204030204" pitchFamily="49" charset="0"/>
-              </a:rPr>
-              <a:t>               </a:t>
-            </a:r>
-            <a:r>
-              <a:rPr kumimoji="0" lang="en-US" altLang="en-US" sz="2800" b="0" i="0" u="none" strike="noStrike" cap="none" normalizeH="0" baseline="0" dirty="0" smtClean="0">
-                <a:ln>
-                  <a:noFill/>
-                </a:ln>
-                <a:solidFill>
-                  <a:srgbClr val="0000FF"/>
-                </a:solidFill>
-                <a:effectLst/>
-                <a:latin typeface="Consolas" panose="020B0609020204030204" pitchFamily="49" charset="0"/>
-                <a:cs typeface="Consolas" panose="020B0609020204030204" pitchFamily="49" charset="0"/>
-              </a:rPr>
-              <a:t>where</a:t>
-            </a:r>
-            <a:r>
-              <a:rPr kumimoji="0" lang="en-US" altLang="en-US" sz="2800" b="0" i="0" u="none" strike="noStrike" cap="none" normalizeH="0" baseline="0" dirty="0" smtClean="0">
-                <a:ln>
-                  <a:noFill/>
-                </a:ln>
-                <a:solidFill>
-                  <a:srgbClr val="000000"/>
-                </a:solidFill>
-                <a:effectLst/>
-                <a:latin typeface="Consolas" panose="020B0609020204030204" pitchFamily="49" charset="0"/>
-                <a:cs typeface="Consolas" panose="020B0609020204030204" pitchFamily="49" charset="0"/>
-              </a:rPr>
-              <a:t> </a:t>
-            </a:r>
-            <a:r>
-              <a:rPr kumimoji="0" lang="en-US" altLang="en-US" sz="2800" b="0" i="0" u="none" strike="noStrike" cap="none" normalizeH="0" baseline="0" dirty="0" err="1" smtClean="0">
-                <a:ln>
-                  <a:noFill/>
-                </a:ln>
-                <a:solidFill>
-                  <a:srgbClr val="000000"/>
-                </a:solidFill>
-                <a:effectLst/>
-                <a:latin typeface="Consolas" panose="020B0609020204030204" pitchFamily="49" charset="0"/>
-                <a:cs typeface="Consolas" panose="020B0609020204030204" pitchFamily="49" charset="0"/>
-              </a:rPr>
-              <a:t>r.RecipeId</a:t>
-            </a:r>
-            <a:r>
-              <a:rPr kumimoji="0" lang="en-US" altLang="en-US" sz="2800" b="0" i="0" u="none" strike="noStrike" cap="none" normalizeH="0" baseline="0" dirty="0" smtClean="0">
-                <a:ln>
-                  <a:noFill/>
-                </a:ln>
-                <a:solidFill>
-                  <a:srgbClr val="000000"/>
-                </a:solidFill>
-                <a:effectLst/>
-                <a:latin typeface="Consolas" panose="020B0609020204030204" pitchFamily="49" charset="0"/>
-                <a:cs typeface="Consolas" panose="020B0609020204030204" pitchFamily="49" charset="0"/>
-              </a:rPr>
-              <a:t> == </a:t>
-            </a:r>
-            <a:r>
-              <a:rPr kumimoji="0" lang="en-US" altLang="en-US" sz="2800" b="0" i="0" u="none" strike="noStrike" cap="none" normalizeH="0" baseline="0" dirty="0" err="1" smtClean="0">
-                <a:ln>
-                  <a:noFill/>
-                </a:ln>
-                <a:solidFill>
-                  <a:srgbClr val="000000"/>
-                </a:solidFill>
-                <a:effectLst/>
-                <a:latin typeface="Consolas" panose="020B0609020204030204" pitchFamily="49" charset="0"/>
-                <a:cs typeface="Consolas" panose="020B0609020204030204" pitchFamily="49" charset="0"/>
-              </a:rPr>
-              <a:t>recipeId</a:t>
-            </a:r>
-            <a:endParaRPr kumimoji="0" lang="en-US" altLang="en-US" sz="2800" b="0" i="0" u="none" strike="noStrike" cap="none" normalizeH="0" baseline="0" dirty="0" smtClean="0">
-              <a:ln>
-                <a:noFill/>
-              </a:ln>
-              <a:solidFill>
-                <a:srgbClr val="000000"/>
-              </a:solidFill>
-              <a:effectLst/>
-              <a:latin typeface="Consolas" panose="020B0609020204030204" pitchFamily="49" charset="0"/>
-              <a:cs typeface="Consolas" panose="020B0609020204030204" pitchFamily="49" charset="0"/>
-            </a:endParaRPr>
-          </a:p>
-          <a:p>
-            <a:pPr marL="0" marR="0" lvl="0" indent="0" algn="l" defTabSz="914400" rtl="0" eaLnBrk="0" fontAlgn="base" latinLnBrk="0" hangingPunct="0">
-              <a:lnSpc>
-                <a:spcPct val="100000"/>
-              </a:lnSpc>
-              <a:spcBef>
-                <a:spcPct val="0"/>
-              </a:spcBef>
-              <a:spcAft>
-                <a:spcPct val="0"/>
-              </a:spcAft>
-              <a:buClrTx/>
-              <a:buSzTx/>
-              <a:buFontTx/>
-              <a:buNone/>
-              <a:tabLst/>
-            </a:pPr>
-            <a:r>
-              <a:rPr kumimoji="0" lang="en-US" altLang="en-US" sz="2800" b="0" i="0" u="none" strike="noStrike" cap="none" normalizeH="0" baseline="0" dirty="0" smtClean="0">
-                <a:ln>
-                  <a:noFill/>
-                </a:ln>
-                <a:solidFill>
-                  <a:srgbClr val="000000"/>
-                </a:solidFill>
-                <a:effectLst/>
-                <a:latin typeface="Consolas" panose="020B0609020204030204" pitchFamily="49" charset="0"/>
-                <a:cs typeface="Consolas" panose="020B0609020204030204" pitchFamily="49" charset="0"/>
-              </a:rPr>
-              <a:t>               </a:t>
-            </a:r>
-            <a:r>
-              <a:rPr kumimoji="0" lang="en-US" altLang="en-US" sz="2800" b="0" i="0" u="none" strike="noStrike" cap="none" normalizeH="0" baseline="0" dirty="0" smtClean="0">
-                <a:ln>
-                  <a:noFill/>
-                </a:ln>
-                <a:solidFill>
-                  <a:srgbClr val="0000FF"/>
-                </a:solidFill>
-                <a:effectLst/>
-                <a:latin typeface="Consolas" panose="020B0609020204030204" pitchFamily="49" charset="0"/>
-                <a:cs typeface="Consolas" panose="020B0609020204030204" pitchFamily="49" charset="0"/>
-              </a:rPr>
-              <a:t>from</a:t>
-            </a:r>
-            <a:r>
-              <a:rPr kumimoji="0" lang="en-US" altLang="en-US" sz="2800" b="0" i="0" u="none" strike="noStrike" cap="none" normalizeH="0" baseline="0" dirty="0" smtClean="0">
-                <a:ln>
-                  <a:noFill/>
-                </a:ln>
-                <a:solidFill>
-                  <a:srgbClr val="000000"/>
-                </a:solidFill>
-                <a:effectLst/>
-                <a:latin typeface="Consolas" panose="020B0609020204030204" pitchFamily="49" charset="0"/>
-                <a:cs typeface="Consolas" panose="020B0609020204030204" pitchFamily="49" charset="0"/>
-              </a:rPr>
-              <a:t> </a:t>
-            </a:r>
-            <a:r>
-              <a:rPr kumimoji="0" lang="en-US" altLang="en-US" sz="2800" b="0" i="0" u="none" strike="noStrike" cap="none" normalizeH="0" baseline="0" dirty="0" err="1" smtClean="0">
-                <a:ln>
-                  <a:noFill/>
-                </a:ln>
-                <a:solidFill>
-                  <a:srgbClr val="000000"/>
-                </a:solidFill>
-                <a:effectLst/>
-                <a:latin typeface="Consolas" panose="020B0609020204030204" pitchFamily="49" charset="0"/>
-                <a:cs typeface="Consolas" panose="020B0609020204030204" pitchFamily="49" charset="0"/>
-              </a:rPr>
-              <a:t>i</a:t>
-            </a:r>
-            <a:r>
-              <a:rPr kumimoji="0" lang="en-US" altLang="en-US" sz="2800" b="0" i="0" u="none" strike="noStrike" cap="none" normalizeH="0" baseline="0" dirty="0" smtClean="0">
-                <a:ln>
-                  <a:noFill/>
-                </a:ln>
-                <a:solidFill>
-                  <a:srgbClr val="000000"/>
-                </a:solidFill>
-                <a:effectLst/>
-                <a:latin typeface="Consolas" panose="020B0609020204030204" pitchFamily="49" charset="0"/>
-                <a:cs typeface="Consolas" panose="020B0609020204030204" pitchFamily="49" charset="0"/>
-              </a:rPr>
-              <a:t> </a:t>
-            </a:r>
-            <a:r>
-              <a:rPr kumimoji="0" lang="en-US" altLang="en-US" sz="2800" b="0" i="0" u="none" strike="noStrike" cap="none" normalizeH="0" baseline="0" dirty="0" smtClean="0">
-                <a:ln>
-                  <a:noFill/>
-                </a:ln>
-                <a:solidFill>
-                  <a:srgbClr val="0000FF"/>
-                </a:solidFill>
-                <a:effectLst/>
-                <a:latin typeface="Consolas" panose="020B0609020204030204" pitchFamily="49" charset="0"/>
-                <a:cs typeface="Consolas" panose="020B0609020204030204" pitchFamily="49" charset="0"/>
-              </a:rPr>
-              <a:t>in</a:t>
-            </a:r>
-            <a:r>
-              <a:rPr kumimoji="0" lang="en-US" altLang="en-US" sz="2800" b="0" i="0" u="none" strike="noStrike" cap="none" normalizeH="0" baseline="0" dirty="0" smtClean="0">
-                <a:ln>
-                  <a:noFill/>
-                </a:ln>
-                <a:solidFill>
-                  <a:srgbClr val="000000"/>
-                </a:solidFill>
-                <a:effectLst/>
-                <a:latin typeface="Consolas" panose="020B0609020204030204" pitchFamily="49" charset="0"/>
-                <a:cs typeface="Consolas" panose="020B0609020204030204" pitchFamily="49" charset="0"/>
-              </a:rPr>
-              <a:t> </a:t>
-            </a:r>
-            <a:r>
-              <a:rPr kumimoji="0" lang="en-US" altLang="en-US" sz="2800" b="0" i="0" u="none" strike="noStrike" cap="none" normalizeH="0" baseline="0" dirty="0" err="1" smtClean="0">
-                <a:ln>
-                  <a:noFill/>
-                </a:ln>
-                <a:solidFill>
-                  <a:srgbClr val="000000"/>
-                </a:solidFill>
-                <a:effectLst/>
-                <a:latin typeface="Consolas" panose="020B0609020204030204" pitchFamily="49" charset="0"/>
-                <a:cs typeface="Consolas" panose="020B0609020204030204" pitchFamily="49" charset="0"/>
-              </a:rPr>
-              <a:t>r.Ingredients</a:t>
-            </a:r>
-            <a:endParaRPr kumimoji="0" lang="en-US" altLang="en-US" sz="2800" b="0" i="0" u="none" strike="noStrike" cap="none" normalizeH="0" baseline="0" dirty="0" smtClean="0">
-              <a:ln>
-                <a:noFill/>
-              </a:ln>
-              <a:solidFill>
-                <a:srgbClr val="000000"/>
-              </a:solidFill>
-              <a:effectLst/>
-              <a:latin typeface="Consolas" panose="020B0609020204030204" pitchFamily="49" charset="0"/>
-              <a:cs typeface="Consolas" panose="020B0609020204030204" pitchFamily="49" charset="0"/>
-            </a:endParaRPr>
-          </a:p>
-          <a:p>
-            <a:pPr marL="0" marR="0" lvl="0" indent="0" algn="l" defTabSz="914400" rtl="0" eaLnBrk="0" fontAlgn="base" latinLnBrk="0" hangingPunct="0">
-              <a:lnSpc>
-                <a:spcPct val="100000"/>
-              </a:lnSpc>
-              <a:spcBef>
-                <a:spcPct val="0"/>
-              </a:spcBef>
-              <a:spcAft>
-                <a:spcPct val="0"/>
-              </a:spcAft>
-              <a:buClrTx/>
-              <a:buSzTx/>
-              <a:buFontTx/>
-              <a:buNone/>
-              <a:tabLst/>
-            </a:pPr>
-            <a:r>
-              <a:rPr kumimoji="0" lang="en-US" altLang="en-US" sz="2800" b="0" i="0" u="none" strike="noStrike" cap="none" normalizeH="0" baseline="0" dirty="0" smtClean="0">
-                <a:ln>
-                  <a:noFill/>
-                </a:ln>
-                <a:solidFill>
-                  <a:srgbClr val="000000"/>
-                </a:solidFill>
-                <a:effectLst/>
-                <a:latin typeface="Consolas" panose="020B0609020204030204" pitchFamily="49" charset="0"/>
-                <a:cs typeface="Consolas" panose="020B0609020204030204" pitchFamily="49" charset="0"/>
-              </a:rPr>
-              <a:t>               </a:t>
-            </a:r>
-            <a:r>
-              <a:rPr kumimoji="0" lang="en-US" altLang="en-US" sz="2800" b="0" i="0" u="none" strike="noStrike" cap="none" normalizeH="0" baseline="0" dirty="0" smtClean="0">
-                <a:ln>
-                  <a:noFill/>
-                </a:ln>
-                <a:solidFill>
-                  <a:srgbClr val="0000FF"/>
-                </a:solidFill>
-                <a:effectLst/>
-                <a:latin typeface="Consolas" panose="020B0609020204030204" pitchFamily="49" charset="0"/>
-                <a:cs typeface="Consolas" panose="020B0609020204030204" pitchFamily="49" charset="0"/>
-              </a:rPr>
-              <a:t>select</a:t>
-            </a:r>
-            <a:r>
-              <a:rPr kumimoji="0" lang="en-US" altLang="en-US" sz="2800" b="0" i="0" u="none" strike="noStrike" cap="none" normalizeH="0" baseline="0" dirty="0" smtClean="0">
-                <a:ln>
-                  <a:noFill/>
-                </a:ln>
-                <a:solidFill>
-                  <a:srgbClr val="000000"/>
-                </a:solidFill>
-                <a:effectLst/>
-                <a:latin typeface="Consolas" panose="020B0609020204030204" pitchFamily="49" charset="0"/>
-                <a:cs typeface="Consolas" panose="020B0609020204030204" pitchFamily="49" charset="0"/>
-              </a:rPr>
-              <a:t> </a:t>
-            </a:r>
-            <a:r>
-              <a:rPr kumimoji="0" lang="en-US" altLang="en-US" sz="2800" b="0" i="0" u="none" strike="noStrike" cap="none" normalizeH="0" baseline="0" dirty="0" err="1" smtClean="0">
-                <a:ln>
-                  <a:noFill/>
-                </a:ln>
-                <a:solidFill>
-                  <a:srgbClr val="000000"/>
-                </a:solidFill>
-                <a:effectLst/>
-                <a:latin typeface="Consolas" panose="020B0609020204030204" pitchFamily="49" charset="0"/>
-                <a:cs typeface="Consolas" panose="020B0609020204030204" pitchFamily="49" charset="0"/>
-              </a:rPr>
-              <a:t>i</a:t>
-            </a:r>
-            <a:r>
-              <a:rPr kumimoji="0" lang="en-US" altLang="en-US" sz="2800" b="0" i="0" u="none" strike="noStrike" cap="none" normalizeH="0" baseline="0" dirty="0" smtClean="0">
-                <a:ln>
-                  <a:noFill/>
-                </a:ln>
-                <a:solidFill>
-                  <a:srgbClr val="000000"/>
-                </a:solidFill>
-                <a:effectLst/>
-                <a:latin typeface="Consolas" panose="020B0609020204030204" pitchFamily="49" charset="0"/>
-                <a:cs typeface="Consolas" panose="020B0609020204030204" pitchFamily="49" charset="0"/>
-              </a:rPr>
-              <a:t>;</a:t>
-            </a:r>
-            <a:endParaRPr kumimoji="0" lang="en-US" altLang="en-US" sz="2800" b="0" i="0" u="none" strike="noStrike" cap="none" normalizeH="0" baseline="0" dirty="0" smtClean="0">
-              <a:ln>
-                <a:noFill/>
-              </a:ln>
-              <a:solidFill>
-                <a:schemeClr val="tx1"/>
-              </a:solidFill>
-              <a:effectLst/>
-              <a:latin typeface="Arial" panose="020B0604020202020204" pitchFamily="34" charset="0"/>
-            </a:endParaRPr>
+            <a:r>
+              <a:rPr lang="en-US" dirty="0" smtClean="0"/>
+              <a:t>Services/{Controller}/[id]</a:t>
+            </a:r>
+          </a:p>
+          <a:p>
+            <a:r>
+              <a:rPr lang="en-US" dirty="0" smtClean="0"/>
+              <a:t>Services/{Controller}/{Action}/[id]</a:t>
+            </a:r>
+          </a:p>
+          <a:p>
+            <a:r>
+              <a:rPr lang="en-US" dirty="0" smtClean="0"/>
+              <a:t>[Attribute]</a:t>
+            </a:r>
+            <a:endParaRPr lang="en-US" dirty="0"/>
           </a:p>
         </p:txBody>
       </p:sp>
     </p:spTree>
     <p:extLst>
       <p:ext uri="{BB962C8B-B14F-4D97-AF65-F5344CB8AC3E}">
-        <p14:creationId xmlns:p14="http://schemas.microsoft.com/office/powerpoint/2010/main" val="1334081695"/>
+        <p14:creationId xmlns:p14="http://schemas.microsoft.com/office/powerpoint/2010/main" val="2203644204"/>
       </p:ext>
     </p:extLst>
   </p:cSld>
@@ -9891,7 +10925,11 @@
           <a:p>
             <a:r>
               <a:rPr lang="en-US" dirty="0" smtClean="0"/>
-              <a:t>OData query specification</a:t>
+              <a:t>Enable </a:t>
+            </a:r>
+            <a:r>
+              <a:rPr lang="en-US" dirty="0" err="1" smtClean="0"/>
+              <a:t>IQueryable</a:t>
             </a:r>
             <a:endParaRPr lang="en-US" dirty="0"/>
           </a:p>
@@ -9899,136 +10937,544 @@
       </p:sp>
       <p:sp>
         <p:nvSpPr>
-          <p:cNvPr id="3" name="Content Placeholder 2"/>
-          <p:cNvSpPr>
-            <a:spLocks noGrp="1"/>
-          </p:cNvSpPr>
-          <p:nvPr>
-            <p:ph sz="half" idx="1"/>
-          </p:nvPr>
-        </p:nvSpPr>
-        <p:spPr/>
-        <p:txBody>
-          <a:bodyPr>
-            <a:normAutofit/>
-          </a:bodyPr>
-          <a:lstStyle/>
-          <a:p>
-            <a:r>
-              <a:rPr lang="en-US" sz="2800" dirty="0" smtClean="0"/>
-              <a:t>$filter</a:t>
-            </a:r>
-          </a:p>
-          <a:p>
-            <a:r>
-              <a:rPr lang="en-US" sz="2800" dirty="0" smtClean="0"/>
-              <a:t>$count</a:t>
-            </a:r>
-          </a:p>
-          <a:p>
-            <a:r>
-              <a:rPr lang="en-US" sz="2800" dirty="0" smtClean="0"/>
-              <a:t>$</a:t>
-            </a:r>
-            <a:r>
-              <a:rPr lang="en-US" sz="2800" dirty="0" err="1" smtClean="0"/>
-              <a:t>orderby</a:t>
-            </a:r>
-            <a:endParaRPr lang="en-US" sz="2800" dirty="0" smtClean="0"/>
-          </a:p>
-          <a:p>
-            <a:r>
-              <a:rPr lang="en-US" sz="2800" dirty="0" smtClean="0"/>
-              <a:t>$skip</a:t>
-            </a:r>
-          </a:p>
-          <a:p>
-            <a:r>
-              <a:rPr lang="en-US" sz="2800" dirty="0" smtClean="0"/>
-              <a:t>$top</a:t>
-            </a:r>
-            <a:endParaRPr lang="en-US" sz="2800" dirty="0"/>
-          </a:p>
-        </p:txBody>
-      </p:sp>
-      <p:sp>
-        <p:nvSpPr>
-          <p:cNvPr id="5" name="Content Placeholder 4"/>
-          <p:cNvSpPr>
-            <a:spLocks noGrp="1"/>
-          </p:cNvSpPr>
-          <p:nvPr>
-            <p:ph sz="half" idx="2"/>
-          </p:nvPr>
-        </p:nvSpPr>
-        <p:spPr/>
-        <p:txBody>
-          <a:bodyPr>
-            <a:normAutofit/>
-          </a:bodyPr>
-          <a:lstStyle/>
-          <a:p>
-            <a:r>
-              <a:rPr lang="en-US" sz="2800" dirty="0" smtClean="0"/>
-              <a:t>$select</a:t>
-            </a:r>
-          </a:p>
-          <a:p>
-            <a:r>
-              <a:rPr lang="en-US" sz="2800" dirty="0" smtClean="0"/>
-              <a:t>$expand</a:t>
-            </a:r>
-          </a:p>
-          <a:p>
-            <a:r>
-              <a:rPr lang="en-US" sz="2800" dirty="0" smtClean="0"/>
-              <a:t>$</a:t>
-            </a:r>
-            <a:r>
-              <a:rPr lang="en-US" sz="2800" dirty="0" err="1" smtClean="0"/>
-              <a:t>inlinecount</a:t>
-            </a:r>
-            <a:endParaRPr lang="en-US" sz="2800" dirty="0" smtClean="0"/>
-          </a:p>
-          <a:p>
-            <a:endParaRPr lang="en-US" sz="2800" dirty="0"/>
-          </a:p>
-        </p:txBody>
-      </p:sp>
-      <p:sp>
-        <p:nvSpPr>
-          <p:cNvPr id="4" name="TextBox 3"/>
-          <p:cNvSpPr txBox="1"/>
-          <p:nvPr/>
-        </p:nvSpPr>
-        <p:spPr>
+          <p:cNvPr id="4" name="Rectangle 1"/>
+          <p:cNvSpPr>
+            <a:spLocks noGrp="1" noChangeArrowheads="1"/>
+          </p:cNvSpPr>
+          <p:nvPr>
+            <p:ph idx="1"/>
+          </p:nvPr>
+        </p:nvSpPr>
+        <p:spPr bwMode="auto">
           <a:xfrm>
-            <a:off x="2151530" y="6019799"/>
-            <a:ext cx="10040470" cy="400110"/>
+            <a:off x="1484310" y="3321159"/>
+            <a:ext cx="8662949" cy="1815882"/>
           </a:xfrm>
           <a:prstGeom prst="rect">
             <a:avLst/>
           </a:prstGeom>
-          <a:noFill/>
+          <a:solidFill>
+            <a:srgbClr val="FFFFFF"/>
+          </a:solidFill>
+          <a:ln>
+            <a:noFill/>
+          </a:ln>
+          <a:effectLst/>
+          <a:extLst>
+            <a:ext uri="{91240B29-F687-4F45-9708-019B960494DF}">
+              <a14:hiddenLine xmlns:a14="http://schemas.microsoft.com/office/drawing/2010/main" w="9525">
+                <a:solidFill>
+                  <a:schemeClr val="tx1"/>
+                </a:solidFill>
+                <a:miter lim="800000"/>
+                <a:headEnd/>
+                <a:tailEnd/>
+              </a14:hiddenLine>
+            </a:ext>
+            <a:ext uri="{AF507438-7753-43E0-B8FC-AC1667EBCBE1}">
+              <a14:hiddenEffects xmlns:a14="http://schemas.microsoft.com/office/drawing/2010/main">
+                <a:effectLst>
+                  <a:outerShdw dist="35921" dir="2700000" algn="ctr" rotWithShape="0">
+                    <a:schemeClr val="bg2"/>
+                  </a:outerShdw>
+                </a:effectLst>
+              </a14:hiddenEffects>
+            </a:ext>
+          </a:extLst>
         </p:spPr>
         <p:txBody>
-          <a:bodyPr wrap="square" rtlCol="0">
+          <a:bodyPr vert="horz" wrap="none" lIns="91440" tIns="45720" rIns="91440" bIns="45720" numCol="1" anchor="ctr" anchorCtr="0" compatLnSpc="1">
+            <a:prstTxWarp prst="textNoShape">
+              <a:avLst/>
+            </a:prstTxWarp>
             <a:spAutoFit/>
           </a:bodyPr>
           <a:lstStyle/>
           <a:p>
-            <a:r>
-              <a:rPr lang="en-US" sz="2000" dirty="0" smtClean="0"/>
-              <a:t>http://docs.oasis-open.org/odata/odata/v4.0/odata-v4.0-part2-url-conventions.html</a:t>
-            </a:r>
-            <a:endParaRPr lang="en-US" sz="2000" dirty="0"/>
+            <a:pPr marL="0" marR="0" lvl="0" indent="0" algn="l" defTabSz="914400" rtl="0" eaLnBrk="0" fontAlgn="base" latinLnBrk="0" hangingPunct="0">
+              <a:lnSpc>
+                <a:spcPct val="100000"/>
+              </a:lnSpc>
+              <a:spcBef>
+                <a:spcPct val="0"/>
+              </a:spcBef>
+              <a:spcAft>
+                <a:spcPct val="0"/>
+              </a:spcAft>
+              <a:buClrTx/>
+              <a:buSzTx/>
+              <a:buFontTx/>
+              <a:buNone/>
+              <a:tabLst/>
+            </a:pPr>
+            <a:r>
+              <a:rPr kumimoji="0" lang="en-US" altLang="en-US" sz="2800" b="0" i="0" u="none" strike="noStrike" cap="none" normalizeH="0" baseline="0" dirty="0" err="1" smtClean="0">
+                <a:ln>
+                  <a:noFill/>
+                </a:ln>
+                <a:solidFill>
+                  <a:srgbClr val="0000FF"/>
+                </a:solidFill>
+                <a:effectLst/>
+                <a:latin typeface="Consolas" panose="020B0609020204030204" pitchFamily="49" charset="0"/>
+                <a:cs typeface="Consolas" panose="020B0609020204030204" pitchFamily="49" charset="0"/>
+              </a:rPr>
+              <a:t>var</a:t>
+            </a:r>
+            <a:r>
+              <a:rPr kumimoji="0" lang="en-US" altLang="en-US" sz="2800" b="0" i="0" u="none" strike="noStrike" cap="none" normalizeH="0" baseline="0" dirty="0" smtClean="0">
+                <a:ln>
+                  <a:noFill/>
+                </a:ln>
+                <a:solidFill>
+                  <a:srgbClr val="000000"/>
+                </a:solidFill>
+                <a:effectLst/>
+                <a:latin typeface="Consolas" panose="020B0609020204030204" pitchFamily="49" charset="0"/>
+                <a:cs typeface="Consolas" panose="020B0609020204030204" pitchFamily="49" charset="0"/>
+              </a:rPr>
+              <a:t> results = </a:t>
+            </a:r>
+            <a:r>
+              <a:rPr kumimoji="0" lang="en-US" altLang="en-US" sz="2800" b="0" i="0" u="none" strike="noStrike" cap="none" normalizeH="0" baseline="0" dirty="0" smtClean="0">
+                <a:ln>
+                  <a:noFill/>
+                </a:ln>
+                <a:solidFill>
+                  <a:srgbClr val="0000FF"/>
+                </a:solidFill>
+                <a:effectLst/>
+                <a:latin typeface="Consolas" panose="020B0609020204030204" pitchFamily="49" charset="0"/>
+                <a:cs typeface="Consolas" panose="020B0609020204030204" pitchFamily="49" charset="0"/>
+              </a:rPr>
+              <a:t>from</a:t>
+            </a:r>
+            <a:r>
+              <a:rPr kumimoji="0" lang="en-US" altLang="en-US" sz="2800" b="0" i="0" u="none" strike="noStrike" cap="none" normalizeH="0" baseline="0" dirty="0" smtClean="0">
+                <a:ln>
+                  <a:noFill/>
+                </a:ln>
+                <a:solidFill>
+                  <a:srgbClr val="000000"/>
+                </a:solidFill>
+                <a:effectLst/>
+                <a:latin typeface="Consolas" panose="020B0609020204030204" pitchFamily="49" charset="0"/>
+                <a:cs typeface="Consolas" panose="020B0609020204030204" pitchFamily="49" charset="0"/>
+              </a:rPr>
+              <a:t> r </a:t>
+            </a:r>
+            <a:r>
+              <a:rPr kumimoji="0" lang="en-US" altLang="en-US" sz="2800" b="0" i="0" u="none" strike="noStrike" cap="none" normalizeH="0" baseline="0" dirty="0" smtClean="0">
+                <a:ln>
+                  <a:noFill/>
+                </a:ln>
+                <a:solidFill>
+                  <a:srgbClr val="0000FF"/>
+                </a:solidFill>
+                <a:effectLst/>
+                <a:latin typeface="Consolas" panose="020B0609020204030204" pitchFamily="49" charset="0"/>
+                <a:cs typeface="Consolas" panose="020B0609020204030204" pitchFamily="49" charset="0"/>
+              </a:rPr>
+              <a:t>in</a:t>
+            </a:r>
+            <a:r>
+              <a:rPr kumimoji="0" lang="en-US" altLang="en-US" sz="2800" b="0" i="0" u="none" strike="noStrike" cap="none" normalizeH="0" baseline="0" dirty="0" smtClean="0">
+                <a:ln>
+                  <a:noFill/>
+                </a:ln>
+                <a:solidFill>
+                  <a:srgbClr val="000000"/>
+                </a:solidFill>
+                <a:effectLst/>
+                <a:latin typeface="Consolas" panose="020B0609020204030204" pitchFamily="49" charset="0"/>
+                <a:cs typeface="Consolas" panose="020B0609020204030204" pitchFamily="49" charset="0"/>
+              </a:rPr>
+              <a:t> </a:t>
+            </a:r>
+            <a:r>
+              <a:rPr kumimoji="0" lang="en-US" altLang="en-US" sz="2800" b="0" i="0" u="none" strike="noStrike" cap="none" normalizeH="0" baseline="0" dirty="0" err="1" smtClean="0">
+                <a:ln>
+                  <a:noFill/>
+                </a:ln>
+                <a:solidFill>
+                  <a:srgbClr val="000000"/>
+                </a:solidFill>
+                <a:effectLst/>
+                <a:latin typeface="Consolas" panose="020B0609020204030204" pitchFamily="49" charset="0"/>
+                <a:cs typeface="Consolas" panose="020B0609020204030204" pitchFamily="49" charset="0"/>
+              </a:rPr>
+              <a:t>db.Recipes</a:t>
+            </a:r>
+            <a:endParaRPr kumimoji="0" lang="en-US" altLang="en-US" sz="2800" b="0" i="0" u="none" strike="noStrike" cap="none" normalizeH="0" baseline="0" dirty="0" smtClean="0">
+              <a:ln>
+                <a:noFill/>
+              </a:ln>
+              <a:solidFill>
+                <a:srgbClr val="000000"/>
+              </a:solidFill>
+              <a:effectLst/>
+              <a:latin typeface="Consolas" panose="020B0609020204030204" pitchFamily="49" charset="0"/>
+              <a:cs typeface="Consolas" panose="020B0609020204030204" pitchFamily="49" charset="0"/>
+            </a:endParaRPr>
+          </a:p>
+          <a:p>
+            <a:pPr marL="0" marR="0" lvl="0" indent="0" algn="l" defTabSz="914400" rtl="0" eaLnBrk="0" fontAlgn="base" latinLnBrk="0" hangingPunct="0">
+              <a:lnSpc>
+                <a:spcPct val="100000"/>
+              </a:lnSpc>
+              <a:spcBef>
+                <a:spcPct val="0"/>
+              </a:spcBef>
+              <a:spcAft>
+                <a:spcPct val="0"/>
+              </a:spcAft>
+              <a:buClrTx/>
+              <a:buSzTx/>
+              <a:buFontTx/>
+              <a:buNone/>
+              <a:tabLst/>
+            </a:pPr>
+            <a:r>
+              <a:rPr kumimoji="0" lang="en-US" altLang="en-US" sz="2800" b="0" i="0" u="none" strike="noStrike" cap="none" normalizeH="0" baseline="0" dirty="0" smtClean="0">
+                <a:ln>
+                  <a:noFill/>
+                </a:ln>
+                <a:solidFill>
+                  <a:srgbClr val="000000"/>
+                </a:solidFill>
+                <a:effectLst/>
+                <a:latin typeface="Consolas" panose="020B0609020204030204" pitchFamily="49" charset="0"/>
+                <a:cs typeface="Consolas" panose="020B0609020204030204" pitchFamily="49" charset="0"/>
+              </a:rPr>
+              <a:t>               </a:t>
+            </a:r>
+            <a:r>
+              <a:rPr kumimoji="0" lang="en-US" altLang="en-US" sz="2800" b="0" i="0" u="none" strike="noStrike" cap="none" normalizeH="0" baseline="0" dirty="0" smtClean="0">
+                <a:ln>
+                  <a:noFill/>
+                </a:ln>
+                <a:solidFill>
+                  <a:srgbClr val="0000FF"/>
+                </a:solidFill>
+                <a:effectLst/>
+                <a:latin typeface="Consolas" panose="020B0609020204030204" pitchFamily="49" charset="0"/>
+                <a:cs typeface="Consolas" panose="020B0609020204030204" pitchFamily="49" charset="0"/>
+              </a:rPr>
+              <a:t>where</a:t>
+            </a:r>
+            <a:r>
+              <a:rPr kumimoji="0" lang="en-US" altLang="en-US" sz="2800" b="0" i="0" u="none" strike="noStrike" cap="none" normalizeH="0" baseline="0" dirty="0" smtClean="0">
+                <a:ln>
+                  <a:noFill/>
+                </a:ln>
+                <a:solidFill>
+                  <a:srgbClr val="000000"/>
+                </a:solidFill>
+                <a:effectLst/>
+                <a:latin typeface="Consolas" panose="020B0609020204030204" pitchFamily="49" charset="0"/>
+                <a:cs typeface="Consolas" panose="020B0609020204030204" pitchFamily="49" charset="0"/>
+              </a:rPr>
+              <a:t> </a:t>
+            </a:r>
+            <a:r>
+              <a:rPr kumimoji="0" lang="en-US" altLang="en-US" sz="2800" b="0" i="0" u="none" strike="noStrike" cap="none" normalizeH="0" baseline="0" dirty="0" err="1" smtClean="0">
+                <a:ln>
+                  <a:noFill/>
+                </a:ln>
+                <a:solidFill>
+                  <a:srgbClr val="000000"/>
+                </a:solidFill>
+                <a:effectLst/>
+                <a:latin typeface="Consolas" panose="020B0609020204030204" pitchFamily="49" charset="0"/>
+                <a:cs typeface="Consolas" panose="020B0609020204030204" pitchFamily="49" charset="0"/>
+              </a:rPr>
+              <a:t>r.RecipeId</a:t>
+            </a:r>
+            <a:r>
+              <a:rPr kumimoji="0" lang="en-US" altLang="en-US" sz="2800" b="0" i="0" u="none" strike="noStrike" cap="none" normalizeH="0" baseline="0" dirty="0" smtClean="0">
+                <a:ln>
+                  <a:noFill/>
+                </a:ln>
+                <a:solidFill>
+                  <a:srgbClr val="000000"/>
+                </a:solidFill>
+                <a:effectLst/>
+                <a:latin typeface="Consolas" panose="020B0609020204030204" pitchFamily="49" charset="0"/>
+                <a:cs typeface="Consolas" panose="020B0609020204030204" pitchFamily="49" charset="0"/>
+              </a:rPr>
+              <a:t> == </a:t>
+            </a:r>
+            <a:r>
+              <a:rPr kumimoji="0" lang="en-US" altLang="en-US" sz="2800" b="0" i="0" u="none" strike="noStrike" cap="none" normalizeH="0" baseline="0" dirty="0" err="1" smtClean="0">
+                <a:ln>
+                  <a:noFill/>
+                </a:ln>
+                <a:solidFill>
+                  <a:srgbClr val="000000"/>
+                </a:solidFill>
+                <a:effectLst/>
+                <a:latin typeface="Consolas" panose="020B0609020204030204" pitchFamily="49" charset="0"/>
+                <a:cs typeface="Consolas" panose="020B0609020204030204" pitchFamily="49" charset="0"/>
+              </a:rPr>
+              <a:t>recipeId</a:t>
+            </a:r>
+            <a:endParaRPr kumimoji="0" lang="en-US" altLang="en-US" sz="2800" b="0" i="0" u="none" strike="noStrike" cap="none" normalizeH="0" baseline="0" dirty="0" smtClean="0">
+              <a:ln>
+                <a:noFill/>
+              </a:ln>
+              <a:solidFill>
+                <a:srgbClr val="000000"/>
+              </a:solidFill>
+              <a:effectLst/>
+              <a:latin typeface="Consolas" panose="020B0609020204030204" pitchFamily="49" charset="0"/>
+              <a:cs typeface="Consolas" panose="020B0609020204030204" pitchFamily="49" charset="0"/>
+            </a:endParaRPr>
+          </a:p>
+          <a:p>
+            <a:pPr marL="0" marR="0" lvl="0" indent="0" algn="l" defTabSz="914400" rtl="0" eaLnBrk="0" fontAlgn="base" latinLnBrk="0" hangingPunct="0">
+              <a:lnSpc>
+                <a:spcPct val="100000"/>
+              </a:lnSpc>
+              <a:spcBef>
+                <a:spcPct val="0"/>
+              </a:spcBef>
+              <a:spcAft>
+                <a:spcPct val="0"/>
+              </a:spcAft>
+              <a:buClrTx/>
+              <a:buSzTx/>
+              <a:buFontTx/>
+              <a:buNone/>
+              <a:tabLst/>
+            </a:pPr>
+            <a:r>
+              <a:rPr kumimoji="0" lang="en-US" altLang="en-US" sz="2800" b="0" i="0" u="none" strike="noStrike" cap="none" normalizeH="0" baseline="0" dirty="0" smtClean="0">
+                <a:ln>
+                  <a:noFill/>
+                </a:ln>
+                <a:solidFill>
+                  <a:srgbClr val="000000"/>
+                </a:solidFill>
+                <a:effectLst/>
+                <a:latin typeface="Consolas" panose="020B0609020204030204" pitchFamily="49" charset="0"/>
+                <a:cs typeface="Consolas" panose="020B0609020204030204" pitchFamily="49" charset="0"/>
+              </a:rPr>
+              <a:t>               </a:t>
+            </a:r>
+            <a:r>
+              <a:rPr kumimoji="0" lang="en-US" altLang="en-US" sz="2800" b="0" i="0" u="none" strike="noStrike" cap="none" normalizeH="0" baseline="0" dirty="0" smtClean="0">
+                <a:ln>
+                  <a:noFill/>
+                </a:ln>
+                <a:solidFill>
+                  <a:srgbClr val="0000FF"/>
+                </a:solidFill>
+                <a:effectLst/>
+                <a:latin typeface="Consolas" panose="020B0609020204030204" pitchFamily="49" charset="0"/>
+                <a:cs typeface="Consolas" panose="020B0609020204030204" pitchFamily="49" charset="0"/>
+              </a:rPr>
+              <a:t>from</a:t>
+            </a:r>
+            <a:r>
+              <a:rPr kumimoji="0" lang="en-US" altLang="en-US" sz="2800" b="0" i="0" u="none" strike="noStrike" cap="none" normalizeH="0" baseline="0" dirty="0" smtClean="0">
+                <a:ln>
+                  <a:noFill/>
+                </a:ln>
+                <a:solidFill>
+                  <a:srgbClr val="000000"/>
+                </a:solidFill>
+                <a:effectLst/>
+                <a:latin typeface="Consolas" panose="020B0609020204030204" pitchFamily="49" charset="0"/>
+                <a:cs typeface="Consolas" panose="020B0609020204030204" pitchFamily="49" charset="0"/>
+              </a:rPr>
+              <a:t> </a:t>
+            </a:r>
+            <a:r>
+              <a:rPr kumimoji="0" lang="en-US" altLang="en-US" sz="2800" b="0" i="0" u="none" strike="noStrike" cap="none" normalizeH="0" baseline="0" dirty="0" err="1" smtClean="0">
+                <a:ln>
+                  <a:noFill/>
+                </a:ln>
+                <a:solidFill>
+                  <a:srgbClr val="000000"/>
+                </a:solidFill>
+                <a:effectLst/>
+                <a:latin typeface="Consolas" panose="020B0609020204030204" pitchFamily="49" charset="0"/>
+                <a:cs typeface="Consolas" panose="020B0609020204030204" pitchFamily="49" charset="0"/>
+              </a:rPr>
+              <a:t>i</a:t>
+            </a:r>
+            <a:r>
+              <a:rPr kumimoji="0" lang="en-US" altLang="en-US" sz="2800" b="0" i="0" u="none" strike="noStrike" cap="none" normalizeH="0" baseline="0" dirty="0" smtClean="0">
+                <a:ln>
+                  <a:noFill/>
+                </a:ln>
+                <a:solidFill>
+                  <a:srgbClr val="000000"/>
+                </a:solidFill>
+                <a:effectLst/>
+                <a:latin typeface="Consolas" panose="020B0609020204030204" pitchFamily="49" charset="0"/>
+                <a:cs typeface="Consolas" panose="020B0609020204030204" pitchFamily="49" charset="0"/>
+              </a:rPr>
+              <a:t> </a:t>
+            </a:r>
+            <a:r>
+              <a:rPr kumimoji="0" lang="en-US" altLang="en-US" sz="2800" b="0" i="0" u="none" strike="noStrike" cap="none" normalizeH="0" baseline="0" dirty="0" smtClean="0">
+                <a:ln>
+                  <a:noFill/>
+                </a:ln>
+                <a:solidFill>
+                  <a:srgbClr val="0000FF"/>
+                </a:solidFill>
+                <a:effectLst/>
+                <a:latin typeface="Consolas" panose="020B0609020204030204" pitchFamily="49" charset="0"/>
+                <a:cs typeface="Consolas" panose="020B0609020204030204" pitchFamily="49" charset="0"/>
+              </a:rPr>
+              <a:t>in</a:t>
+            </a:r>
+            <a:r>
+              <a:rPr kumimoji="0" lang="en-US" altLang="en-US" sz="2800" b="0" i="0" u="none" strike="noStrike" cap="none" normalizeH="0" baseline="0" dirty="0" smtClean="0">
+                <a:ln>
+                  <a:noFill/>
+                </a:ln>
+                <a:solidFill>
+                  <a:srgbClr val="000000"/>
+                </a:solidFill>
+                <a:effectLst/>
+                <a:latin typeface="Consolas" panose="020B0609020204030204" pitchFamily="49" charset="0"/>
+                <a:cs typeface="Consolas" panose="020B0609020204030204" pitchFamily="49" charset="0"/>
+              </a:rPr>
+              <a:t> </a:t>
+            </a:r>
+            <a:r>
+              <a:rPr kumimoji="0" lang="en-US" altLang="en-US" sz="2800" b="0" i="0" u="none" strike="noStrike" cap="none" normalizeH="0" baseline="0" dirty="0" err="1" smtClean="0">
+                <a:ln>
+                  <a:noFill/>
+                </a:ln>
+                <a:solidFill>
+                  <a:srgbClr val="000000"/>
+                </a:solidFill>
+                <a:effectLst/>
+                <a:latin typeface="Consolas" panose="020B0609020204030204" pitchFamily="49" charset="0"/>
+                <a:cs typeface="Consolas" panose="020B0609020204030204" pitchFamily="49" charset="0"/>
+              </a:rPr>
+              <a:t>r.Ingredients</a:t>
+            </a:r>
+            <a:endParaRPr kumimoji="0" lang="en-US" altLang="en-US" sz="2800" b="0" i="0" u="none" strike="noStrike" cap="none" normalizeH="0" baseline="0" dirty="0" smtClean="0">
+              <a:ln>
+                <a:noFill/>
+              </a:ln>
+              <a:solidFill>
+                <a:srgbClr val="000000"/>
+              </a:solidFill>
+              <a:effectLst/>
+              <a:latin typeface="Consolas" panose="020B0609020204030204" pitchFamily="49" charset="0"/>
+              <a:cs typeface="Consolas" panose="020B0609020204030204" pitchFamily="49" charset="0"/>
+            </a:endParaRPr>
+          </a:p>
+          <a:p>
+            <a:pPr marL="0" marR="0" lvl="0" indent="0" algn="l" defTabSz="914400" rtl="0" eaLnBrk="0" fontAlgn="base" latinLnBrk="0" hangingPunct="0">
+              <a:lnSpc>
+                <a:spcPct val="100000"/>
+              </a:lnSpc>
+              <a:spcBef>
+                <a:spcPct val="0"/>
+              </a:spcBef>
+              <a:spcAft>
+                <a:spcPct val="0"/>
+              </a:spcAft>
+              <a:buClrTx/>
+              <a:buSzTx/>
+              <a:buFontTx/>
+              <a:buNone/>
+              <a:tabLst/>
+            </a:pPr>
+            <a:r>
+              <a:rPr kumimoji="0" lang="en-US" altLang="en-US" sz="2800" b="0" i="0" u="none" strike="noStrike" cap="none" normalizeH="0" baseline="0" dirty="0" smtClean="0">
+                <a:ln>
+                  <a:noFill/>
+                </a:ln>
+                <a:solidFill>
+                  <a:srgbClr val="000000"/>
+                </a:solidFill>
+                <a:effectLst/>
+                <a:latin typeface="Consolas" panose="020B0609020204030204" pitchFamily="49" charset="0"/>
+                <a:cs typeface="Consolas" panose="020B0609020204030204" pitchFamily="49" charset="0"/>
+              </a:rPr>
+              <a:t>               </a:t>
+            </a:r>
+            <a:r>
+              <a:rPr kumimoji="0" lang="en-US" altLang="en-US" sz="2800" b="0" i="0" u="none" strike="noStrike" cap="none" normalizeH="0" baseline="0" dirty="0" smtClean="0">
+                <a:ln>
+                  <a:noFill/>
+                </a:ln>
+                <a:solidFill>
+                  <a:srgbClr val="0000FF"/>
+                </a:solidFill>
+                <a:effectLst/>
+                <a:latin typeface="Consolas" panose="020B0609020204030204" pitchFamily="49" charset="0"/>
+                <a:cs typeface="Consolas" panose="020B0609020204030204" pitchFamily="49" charset="0"/>
+              </a:rPr>
+              <a:t>select</a:t>
+            </a:r>
+            <a:r>
+              <a:rPr kumimoji="0" lang="en-US" altLang="en-US" sz="2800" b="0" i="0" u="none" strike="noStrike" cap="none" normalizeH="0" baseline="0" dirty="0" smtClean="0">
+                <a:ln>
+                  <a:noFill/>
+                </a:ln>
+                <a:solidFill>
+                  <a:srgbClr val="000000"/>
+                </a:solidFill>
+                <a:effectLst/>
+                <a:latin typeface="Consolas" panose="020B0609020204030204" pitchFamily="49" charset="0"/>
+                <a:cs typeface="Consolas" panose="020B0609020204030204" pitchFamily="49" charset="0"/>
+              </a:rPr>
+              <a:t> </a:t>
+            </a:r>
+            <a:r>
+              <a:rPr kumimoji="0" lang="en-US" altLang="en-US" sz="2800" b="0" i="0" u="none" strike="noStrike" cap="none" normalizeH="0" baseline="0" dirty="0" err="1" smtClean="0">
+                <a:ln>
+                  <a:noFill/>
+                </a:ln>
+                <a:solidFill>
+                  <a:srgbClr val="000000"/>
+                </a:solidFill>
+                <a:effectLst/>
+                <a:latin typeface="Consolas" panose="020B0609020204030204" pitchFamily="49" charset="0"/>
+                <a:cs typeface="Consolas" panose="020B0609020204030204" pitchFamily="49" charset="0"/>
+              </a:rPr>
+              <a:t>i</a:t>
+            </a:r>
+            <a:r>
+              <a:rPr kumimoji="0" lang="en-US" altLang="en-US" sz="2800" b="0" i="0" u="none" strike="noStrike" cap="none" normalizeH="0" baseline="0" dirty="0" smtClean="0">
+                <a:ln>
+                  <a:noFill/>
+                </a:ln>
+                <a:solidFill>
+                  <a:srgbClr val="000000"/>
+                </a:solidFill>
+                <a:effectLst/>
+                <a:latin typeface="Consolas" panose="020B0609020204030204" pitchFamily="49" charset="0"/>
+                <a:cs typeface="Consolas" panose="020B0609020204030204" pitchFamily="49" charset="0"/>
+              </a:rPr>
+              <a:t>;</a:t>
+            </a:r>
+            <a:endParaRPr kumimoji="0" lang="en-US" altLang="en-US" sz="2800" b="0" i="0" u="none" strike="noStrike" cap="none" normalizeH="0" baseline="0" dirty="0" smtClean="0">
+              <a:ln>
+                <a:noFill/>
+              </a:ln>
+              <a:solidFill>
+                <a:schemeClr val="tx1"/>
+              </a:solidFill>
+              <a:effectLst/>
+              <a:latin typeface="Arial" panose="020B0604020202020204" pitchFamily="34" charset="0"/>
+            </a:endParaRPr>
           </a:p>
         </p:txBody>
       </p:sp>
     </p:spTree>
     <p:extLst>
       <p:ext uri="{BB962C8B-B14F-4D97-AF65-F5344CB8AC3E}">
-        <p14:creationId xmlns:p14="http://schemas.microsoft.com/office/powerpoint/2010/main" val="2102772975"/>
+        <p14:creationId xmlns:p14="http://schemas.microsoft.com/office/powerpoint/2010/main" val="1334081695"/>
       </p:ext>
     </p:extLst>
   </p:cSld>
@@ -10079,7 +11525,7 @@
           <a:p>
             <a:r>
               <a:rPr lang="en-US" dirty="0" smtClean="0"/>
-              <a:t>$filter</a:t>
+              <a:t>OData query specification</a:t>
             </a:r>
             <a:endParaRPr lang="en-US" dirty="0"/>
           </a:p>
@@ -10098,59 +11544,42 @@
         <p:spPr/>
         <p:txBody>
           <a:bodyPr>
-            <a:noAutofit/>
+            <a:normAutofit/>
           </a:bodyPr>
           <a:lstStyle/>
           <a:p>
             <a:r>
+              <a:rPr lang="en-US" sz="2800" dirty="0" smtClean="0"/>
+              <a:t>$filter</a:t>
+            </a:r>
+          </a:p>
+          <a:p>
+            <a:r>
+              <a:rPr lang="en-US" sz="2800" dirty="0" smtClean="0"/>
+              <a:t>$count</a:t>
+            </a:r>
+          </a:p>
+          <a:p>
+            <a:r>
+              <a:rPr lang="en-US" sz="2800" dirty="0" smtClean="0"/>
+              <a:t>$</a:t>
+            </a:r>
+            <a:r>
               <a:rPr lang="en-US" sz="2800" dirty="0" err="1" smtClean="0"/>
-              <a:t>eq</a:t>
-            </a:r>
+              <a:t>orderby</a:t>
+            </a:r>
+            <a:endParaRPr lang="en-US" sz="2800" dirty="0" smtClean="0"/>
+          </a:p>
+          <a:p>
             <a:r>
               <a:rPr lang="en-US" sz="2800" dirty="0" smtClean="0"/>
-              <a:t> – Equals</a:t>
+              <a:t>$skip</a:t>
             </a:r>
           </a:p>
           <a:p>
             <a:r>
               <a:rPr lang="en-US" sz="2800" dirty="0" smtClean="0"/>
-              <a:t>ne  - Not Equals</a:t>
-            </a:r>
-          </a:p>
-          <a:p>
-            <a:r>
-              <a:rPr lang="en-US" sz="2800" dirty="0" err="1" smtClean="0"/>
-              <a:t>gt</a:t>
-            </a:r>
-            <a:r>
-              <a:rPr lang="en-US" sz="2800" dirty="0" smtClean="0"/>
-              <a:t> – Greater Than</a:t>
-            </a:r>
-          </a:p>
-          <a:p>
-            <a:r>
-              <a:rPr lang="en-US" sz="2800" dirty="0" err="1" smtClean="0"/>
-              <a:t>ge</a:t>
-            </a:r>
-            <a:r>
-              <a:rPr lang="en-US" sz="2800" dirty="0" smtClean="0"/>
-              <a:t> – Greater Than or Equal</a:t>
-            </a:r>
-          </a:p>
-          <a:p>
-            <a:r>
-              <a:rPr lang="en-US" sz="2800" dirty="0" err="1" smtClean="0"/>
-              <a:t>lt</a:t>
-            </a:r>
-            <a:r>
-              <a:rPr lang="en-US" sz="2800" dirty="0" smtClean="0"/>
-              <a:t> – Less Than</a:t>
-            </a:r>
-          </a:p>
-          <a:p>
-            <a:r>
-              <a:rPr lang="en-US" sz="2800" dirty="0" smtClean="0"/>
-              <a:t>le – Less than or Equal</a:t>
+              <a:t>$top</a:t>
             </a:r>
             <a:endParaRPr lang="en-US" sz="2800" dirty="0"/>
           </a:p>
@@ -10169,54 +11598,71 @@
         <p:spPr/>
         <p:txBody>
           <a:bodyPr>
-            <a:noAutofit/>
+            <a:normAutofit/>
           </a:bodyPr>
           <a:lstStyle/>
           <a:p>
             <a:r>
+              <a:rPr lang="en-US" sz="2800" dirty="0" smtClean="0"/>
+              <a:t>$select</a:t>
+            </a:r>
+          </a:p>
+          <a:p>
+            <a:r>
+              <a:rPr lang="en-US" sz="2800" dirty="0" smtClean="0"/>
+              <a:t>$expand</a:t>
+            </a:r>
+          </a:p>
+          <a:p>
+            <a:r>
+              <a:rPr lang="en-US" sz="2800" dirty="0" smtClean="0"/>
+              <a:t>$</a:t>
+            </a:r>
+            <a:r>
               <a:rPr lang="en-US" sz="2800" dirty="0" err="1" smtClean="0"/>
-              <a:t>Endswith</a:t>
-            </a:r>
+              <a:t>inlinecount</a:t>
+            </a:r>
+            <a:endParaRPr lang="en-US" sz="2800" dirty="0" smtClean="0"/>
+          </a:p>
+          <a:p>
             <a:endParaRPr lang="en-US" sz="2800" dirty="0"/>
           </a:p>
-          <a:p>
-            <a:r>
-              <a:rPr lang="en-US" sz="2800" dirty="0" err="1" smtClean="0"/>
-              <a:t>Startswith</a:t>
-            </a:r>
-            <a:endParaRPr lang="en-US" sz="2800" dirty="0" smtClean="0"/>
-          </a:p>
-          <a:p>
-            <a:r>
-              <a:rPr lang="en-US" sz="2800" dirty="0" smtClean="0"/>
-              <a:t>Length</a:t>
-            </a:r>
-          </a:p>
-          <a:p>
-            <a:r>
-              <a:rPr lang="en-US" sz="2800" dirty="0" smtClean="0"/>
-              <a:t>substring</a:t>
-            </a:r>
-          </a:p>
-          <a:p>
-            <a:r>
-              <a:rPr lang="en-US" sz="2800" strike="sngStrike" dirty="0" smtClean="0"/>
-              <a:t>Contains</a:t>
-            </a:r>
-          </a:p>
-          <a:p>
-            <a:r>
-              <a:rPr lang="en-US" sz="2800" dirty="0" smtClean="0"/>
-              <a:t>And others</a:t>
-            </a:r>
-            <a:endParaRPr lang="en-US" sz="2800" dirty="0"/>
+        </p:txBody>
+      </p:sp>
+      <p:sp>
+        <p:nvSpPr>
+          <p:cNvPr id="4" name="TextBox 3"/>
+          <p:cNvSpPr txBox="1"/>
+          <p:nvPr/>
+        </p:nvSpPr>
+        <p:spPr>
+          <a:xfrm>
+            <a:off x="2151530" y="6019799"/>
+            <a:ext cx="10040470" cy="400110"/>
+          </a:xfrm>
+          <a:prstGeom prst="rect">
+            <a:avLst/>
+          </a:prstGeom>
+          <a:noFill/>
+        </p:spPr>
+        <p:txBody>
+          <a:bodyPr wrap="square" rtlCol="0">
+            <a:spAutoFit/>
+          </a:bodyPr>
+          <a:lstStyle/>
+          <a:p>
+            <a:r>
+              <a:rPr lang="en-US" sz="2000" dirty="0" smtClean="0"/>
+              <a:t>http://docs.oasis-open.org/odata/odata/v4.0/odata-v4.0-part2-url-conventions.html</a:t>
+            </a:r>
+            <a:endParaRPr lang="en-US" sz="2000" dirty="0"/>
           </a:p>
         </p:txBody>
       </p:sp>
     </p:spTree>
     <p:extLst>
       <p:ext uri="{BB962C8B-B14F-4D97-AF65-F5344CB8AC3E}">
-        <p14:creationId xmlns:p14="http://schemas.microsoft.com/office/powerpoint/2010/main" val="2338928395"/>
+        <p14:creationId xmlns:p14="http://schemas.microsoft.com/office/powerpoint/2010/main" val="2102772975"/>
       </p:ext>
     </p:extLst>
   </p:cSld>

</xml_diff>